<commit_message>
circuit board assembly document
</commit_message>
<xml_diff>
--- a/builds/Arduino-shield.pptx
+++ b/builds/Arduino-shield.pptx
@@ -2,23 +2,23 @@
 <file path=ppt/presentation.xml><?xml version="1.0" encoding="utf-8"?>
 <p:presentation xmlns:a="http://schemas.openxmlformats.org/drawingml/2006/main" xmlns:r="http://schemas.openxmlformats.org/officeDocument/2006/relationships" xmlns:p="http://schemas.openxmlformats.org/presentationml/2006/main" saveSubsetFonts="1">
   <p:sldMasterIdLst>
-    <p:sldMasterId id="2147483648" r:id="rId1"/>
+    <p:sldMasterId id="2147483660" r:id="rId1"/>
   </p:sldMasterIdLst>
   <p:sldIdLst>
     <p:sldId id="256" r:id="rId2"/>
-    <p:sldId id="260" r:id="rId3"/>
-    <p:sldId id="257" r:id="rId4"/>
-    <p:sldId id="258" r:id="rId5"/>
+    <p:sldId id="257" r:id="rId3"/>
+    <p:sldId id="258" r:id="rId4"/>
+    <p:sldId id="260" r:id="rId5"/>
     <p:sldId id="261" r:id="rId6"/>
     <p:sldId id="259" r:id="rId7"/>
   </p:sldIdLst>
-  <p:sldSz cx="12192000" cy="6858000"/>
+  <p:sldSz cx="9144000" cy="6858000" type="screen4x3"/>
   <p:notesSz cx="6858000" cy="9144000"/>
   <p:defaultTextStyle>
     <a:defPPr>
       <a:defRPr lang="en-US"/>
     </a:defPPr>
-    <a:lvl1pPr marL="0" algn="l" defTabSz="914400" rtl="0" eaLnBrk="1" latinLnBrk="0" hangingPunct="1">
+    <a:lvl1pPr marL="0" algn="l" defTabSz="457200" rtl="0" eaLnBrk="1" latinLnBrk="0" hangingPunct="1">
       <a:defRPr sz="1800" kern="1200">
         <a:solidFill>
           <a:schemeClr val="tx1"/>
@@ -28,7 +28,7 @@
         <a:cs typeface="+mn-cs"/>
       </a:defRPr>
     </a:lvl1pPr>
-    <a:lvl2pPr marL="457200" algn="l" defTabSz="914400" rtl="0" eaLnBrk="1" latinLnBrk="0" hangingPunct="1">
+    <a:lvl2pPr marL="457200" algn="l" defTabSz="457200" rtl="0" eaLnBrk="1" latinLnBrk="0" hangingPunct="1">
       <a:defRPr sz="1800" kern="1200">
         <a:solidFill>
           <a:schemeClr val="tx1"/>
@@ -38,7 +38,7 @@
         <a:cs typeface="+mn-cs"/>
       </a:defRPr>
     </a:lvl2pPr>
-    <a:lvl3pPr marL="914400" algn="l" defTabSz="914400" rtl="0" eaLnBrk="1" latinLnBrk="0" hangingPunct="1">
+    <a:lvl3pPr marL="914400" algn="l" defTabSz="457200" rtl="0" eaLnBrk="1" latinLnBrk="0" hangingPunct="1">
       <a:defRPr sz="1800" kern="1200">
         <a:solidFill>
           <a:schemeClr val="tx1"/>
@@ -48,7 +48,7 @@
         <a:cs typeface="+mn-cs"/>
       </a:defRPr>
     </a:lvl3pPr>
-    <a:lvl4pPr marL="1371600" algn="l" defTabSz="914400" rtl="0" eaLnBrk="1" latinLnBrk="0" hangingPunct="1">
+    <a:lvl4pPr marL="1371600" algn="l" defTabSz="457200" rtl="0" eaLnBrk="1" latinLnBrk="0" hangingPunct="1">
       <a:defRPr sz="1800" kern="1200">
         <a:solidFill>
           <a:schemeClr val="tx1"/>
@@ -58,7 +58,7 @@
         <a:cs typeface="+mn-cs"/>
       </a:defRPr>
     </a:lvl4pPr>
-    <a:lvl5pPr marL="1828800" algn="l" defTabSz="914400" rtl="0" eaLnBrk="1" latinLnBrk="0" hangingPunct="1">
+    <a:lvl5pPr marL="1828800" algn="l" defTabSz="457200" rtl="0" eaLnBrk="1" latinLnBrk="0" hangingPunct="1">
       <a:defRPr sz="1800" kern="1200">
         <a:solidFill>
           <a:schemeClr val="tx1"/>
@@ -68,7 +68,7 @@
         <a:cs typeface="+mn-cs"/>
       </a:defRPr>
     </a:lvl5pPr>
-    <a:lvl6pPr marL="2286000" algn="l" defTabSz="914400" rtl="0" eaLnBrk="1" latinLnBrk="0" hangingPunct="1">
+    <a:lvl6pPr marL="2286000" algn="l" defTabSz="457200" rtl="0" eaLnBrk="1" latinLnBrk="0" hangingPunct="1">
       <a:defRPr sz="1800" kern="1200">
         <a:solidFill>
           <a:schemeClr val="tx1"/>
@@ -78,7 +78,7 @@
         <a:cs typeface="+mn-cs"/>
       </a:defRPr>
     </a:lvl6pPr>
-    <a:lvl7pPr marL="2743200" algn="l" defTabSz="914400" rtl="0" eaLnBrk="1" latinLnBrk="0" hangingPunct="1">
+    <a:lvl7pPr marL="2743200" algn="l" defTabSz="457200" rtl="0" eaLnBrk="1" latinLnBrk="0" hangingPunct="1">
       <a:defRPr sz="1800" kern="1200">
         <a:solidFill>
           <a:schemeClr val="tx1"/>
@@ -88,7 +88,7 @@
         <a:cs typeface="+mn-cs"/>
       </a:defRPr>
     </a:lvl7pPr>
-    <a:lvl8pPr marL="3200400" algn="l" defTabSz="914400" rtl="0" eaLnBrk="1" latinLnBrk="0" hangingPunct="1">
+    <a:lvl8pPr marL="3200400" algn="l" defTabSz="457200" rtl="0" eaLnBrk="1" latinLnBrk="0" hangingPunct="1">
       <a:defRPr sz="1800" kern="1200">
         <a:solidFill>
           <a:schemeClr val="tx1"/>
@@ -98,7 +98,7 @@
         <a:cs typeface="+mn-cs"/>
       </a:defRPr>
     </a:lvl8pPr>
-    <a:lvl9pPr marL="3657600" algn="l" defTabSz="914400" rtl="0" eaLnBrk="1" latinLnBrk="0" hangingPunct="1">
+    <a:lvl9pPr marL="3657600" algn="l" defTabSz="457200" rtl="0" eaLnBrk="1" latinLnBrk="0" hangingPunct="1">
       <a:defRPr sz="1800" kern="1200">
         <a:solidFill>
           <a:schemeClr val="tx1"/>
@@ -136,13 +136,7 @@
       </p:grpSpPr>
       <p:sp>
         <p:nvSpPr>
-          <p:cNvPr id="2" name="Title 1">
-            <a:extLst>
-              <a:ext uri="{FF2B5EF4-FFF2-40B4-BE49-F238E27FC236}">
-                <a16:creationId xmlns:a16="http://schemas.microsoft.com/office/drawing/2014/main" id="{19858C81-94CA-67F1-A790-EFDA9F6D7EEC}"/>
-              </a:ext>
-            </a:extLst>
-          </p:cNvPr>
+          <p:cNvPr id="2" name="Title 1"/>
           <p:cNvSpPr>
             <a:spLocks noGrp="1"/>
           </p:cNvSpPr>
@@ -152,8 +146,8 @@
         </p:nvSpPr>
         <p:spPr>
           <a:xfrm>
-            <a:off x="1524000" y="1122363"/>
-            <a:ext cx="9144000" cy="2387600"/>
+            <a:off x="685800" y="1122363"/>
+            <a:ext cx="7772400" cy="2387600"/>
           </a:xfrm>
         </p:spPr>
         <p:txBody>
@@ -168,18 +162,13 @@
               <a:rPr lang="en-US"/>
               <a:t>Click to edit Master title style</a:t>
             </a:r>
-          </a:p>
-        </p:txBody>
-      </p:sp>
-      <p:sp>
-        <p:nvSpPr>
-          <p:cNvPr id="3" name="Subtitle 2">
-            <a:extLst>
-              <a:ext uri="{FF2B5EF4-FFF2-40B4-BE49-F238E27FC236}">
-                <a16:creationId xmlns:a16="http://schemas.microsoft.com/office/drawing/2014/main" id="{ACD7C500-1A26-D873-8DC6-F3F2D312F4EA}"/>
-              </a:ext>
-            </a:extLst>
-          </p:cNvPr>
+            <a:endParaRPr lang="en-US" dirty="0"/>
+          </a:p>
+        </p:txBody>
+      </p:sp>
+      <p:sp>
+        <p:nvSpPr>
+          <p:cNvPr id="3" name="Subtitle 2"/>
           <p:cNvSpPr>
             <a:spLocks noGrp="1"/>
           </p:cNvSpPr>
@@ -189,8 +178,8 @@
         </p:nvSpPr>
         <p:spPr>
           <a:xfrm>
-            <a:off x="1524000" y="3602038"/>
-            <a:ext cx="9144000" cy="1655762"/>
+            <a:off x="1143000" y="3602038"/>
+            <a:ext cx="6858000" cy="1655762"/>
           </a:xfrm>
         </p:spPr>
         <p:txBody>
@@ -238,18 +227,13 @@
               <a:rPr lang="en-US"/>
               <a:t>Click to edit Master subtitle style</a:t>
             </a:r>
-          </a:p>
-        </p:txBody>
-      </p:sp>
-      <p:sp>
-        <p:nvSpPr>
-          <p:cNvPr id="4" name="Date Placeholder 3">
-            <a:extLst>
-              <a:ext uri="{FF2B5EF4-FFF2-40B4-BE49-F238E27FC236}">
-                <a16:creationId xmlns:a16="http://schemas.microsoft.com/office/drawing/2014/main" id="{6A92ECE6-D076-0983-47F2-5D0800C51186}"/>
-              </a:ext>
-            </a:extLst>
-          </p:cNvPr>
+            <a:endParaRPr lang="en-US" dirty="0"/>
+          </a:p>
+        </p:txBody>
+      </p:sp>
+      <p:sp>
+        <p:nvSpPr>
+          <p:cNvPr id="4" name="Date Placeholder 3"/>
           <p:cNvSpPr>
             <a:spLocks noGrp="1"/>
           </p:cNvSpPr>
@@ -272,13 +256,7 @@
       </p:sp>
       <p:sp>
         <p:nvSpPr>
-          <p:cNvPr id="5" name="Footer Placeholder 4">
-            <a:extLst>
-              <a:ext uri="{FF2B5EF4-FFF2-40B4-BE49-F238E27FC236}">
-                <a16:creationId xmlns:a16="http://schemas.microsoft.com/office/drawing/2014/main" id="{1BFDED64-126A-308E-C8DA-673AE0C375E6}"/>
-              </a:ext>
-            </a:extLst>
-          </p:cNvPr>
+          <p:cNvPr id="5" name="Footer Placeholder 4"/>
           <p:cNvSpPr>
             <a:spLocks noGrp="1"/>
           </p:cNvSpPr>
@@ -297,13 +275,7 @@
       </p:sp>
       <p:sp>
         <p:nvSpPr>
-          <p:cNvPr id="6" name="Slide Number Placeholder 5">
-            <a:extLst>
-              <a:ext uri="{FF2B5EF4-FFF2-40B4-BE49-F238E27FC236}">
-                <a16:creationId xmlns:a16="http://schemas.microsoft.com/office/drawing/2014/main" id="{7AEDA6CF-31A7-B97E-6D86-518F71AFCE6E}"/>
-              </a:ext>
-            </a:extLst>
-          </p:cNvPr>
+          <p:cNvPr id="6" name="Slide Number Placeholder 5"/>
           <p:cNvSpPr>
             <a:spLocks noGrp="1"/>
           </p:cNvSpPr>
@@ -327,7 +299,7 @@
     </p:spTree>
     <p:extLst>
       <p:ext uri="{BB962C8B-B14F-4D97-AF65-F5344CB8AC3E}">
-        <p14:creationId xmlns:p14="http://schemas.microsoft.com/office/powerpoint/2010/main" val="1601538665"/>
+        <p14:creationId xmlns:p14="http://schemas.microsoft.com/office/powerpoint/2010/main" val="1032249291"/>
       </p:ext>
     </p:extLst>
   </p:cSld>
@@ -356,13 +328,7 @@
       </p:grpSpPr>
       <p:sp>
         <p:nvSpPr>
-          <p:cNvPr id="2" name="Title 1">
-            <a:extLst>
-              <a:ext uri="{FF2B5EF4-FFF2-40B4-BE49-F238E27FC236}">
-                <a16:creationId xmlns:a16="http://schemas.microsoft.com/office/drawing/2014/main" id="{92C92D87-E714-5AA7-59F9-1AB60469FF88}"/>
-              </a:ext>
-            </a:extLst>
-          </p:cNvPr>
+          <p:cNvPr id="2" name="Title 1"/>
           <p:cNvSpPr>
             <a:spLocks noGrp="1"/>
           </p:cNvSpPr>
@@ -379,18 +345,13 @@
               <a:rPr lang="en-US"/>
               <a:t>Click to edit Master title style</a:t>
             </a:r>
-          </a:p>
-        </p:txBody>
-      </p:sp>
-      <p:sp>
-        <p:nvSpPr>
-          <p:cNvPr id="3" name="Vertical Text Placeholder 2">
-            <a:extLst>
-              <a:ext uri="{FF2B5EF4-FFF2-40B4-BE49-F238E27FC236}">
-                <a16:creationId xmlns:a16="http://schemas.microsoft.com/office/drawing/2014/main" id="{10639944-A3DF-FBAF-6E6F-CC860B6E9ED1}"/>
-              </a:ext>
-            </a:extLst>
-          </p:cNvPr>
+            <a:endParaRPr lang="en-US" dirty="0"/>
+          </a:p>
+        </p:txBody>
+      </p:sp>
+      <p:sp>
+        <p:nvSpPr>
+          <p:cNvPr id="3" name="Vertical Text Placeholder 2"/>
           <p:cNvSpPr>
             <a:spLocks noGrp="1"/>
           </p:cNvSpPr>
@@ -436,18 +397,13 @@
               <a:rPr lang="en-US"/>
               <a:t>Fifth level</a:t>
             </a:r>
-          </a:p>
-        </p:txBody>
-      </p:sp>
-      <p:sp>
-        <p:nvSpPr>
-          <p:cNvPr id="4" name="Date Placeholder 3">
-            <a:extLst>
-              <a:ext uri="{FF2B5EF4-FFF2-40B4-BE49-F238E27FC236}">
-                <a16:creationId xmlns:a16="http://schemas.microsoft.com/office/drawing/2014/main" id="{14AEF1FA-13B3-9559-AE5E-A65DA234E235}"/>
-              </a:ext>
-            </a:extLst>
-          </p:cNvPr>
+            <a:endParaRPr lang="en-US" dirty="0"/>
+          </a:p>
+        </p:txBody>
+      </p:sp>
+      <p:sp>
+        <p:nvSpPr>
+          <p:cNvPr id="4" name="Date Placeholder 3"/>
           <p:cNvSpPr>
             <a:spLocks noGrp="1"/>
           </p:cNvSpPr>
@@ -470,13 +426,7 @@
       </p:sp>
       <p:sp>
         <p:nvSpPr>
-          <p:cNvPr id="5" name="Footer Placeholder 4">
-            <a:extLst>
-              <a:ext uri="{FF2B5EF4-FFF2-40B4-BE49-F238E27FC236}">
-                <a16:creationId xmlns:a16="http://schemas.microsoft.com/office/drawing/2014/main" id="{FDFC3CDA-FD17-D57B-01FD-82FBFC67BD1A}"/>
-              </a:ext>
-            </a:extLst>
-          </p:cNvPr>
+          <p:cNvPr id="5" name="Footer Placeholder 4"/>
           <p:cNvSpPr>
             <a:spLocks noGrp="1"/>
           </p:cNvSpPr>
@@ -495,13 +445,7 @@
       </p:sp>
       <p:sp>
         <p:nvSpPr>
-          <p:cNvPr id="6" name="Slide Number Placeholder 5">
-            <a:extLst>
-              <a:ext uri="{FF2B5EF4-FFF2-40B4-BE49-F238E27FC236}">
-                <a16:creationId xmlns:a16="http://schemas.microsoft.com/office/drawing/2014/main" id="{841C557D-DC08-AF6B-3D0F-18BA3FC8B6C9}"/>
-              </a:ext>
-            </a:extLst>
-          </p:cNvPr>
+          <p:cNvPr id="6" name="Slide Number Placeholder 5"/>
           <p:cNvSpPr>
             <a:spLocks noGrp="1"/>
           </p:cNvSpPr>
@@ -525,7 +469,7 @@
     </p:spTree>
     <p:extLst>
       <p:ext uri="{BB962C8B-B14F-4D97-AF65-F5344CB8AC3E}">
-        <p14:creationId xmlns:p14="http://schemas.microsoft.com/office/powerpoint/2010/main" val="1836443358"/>
+        <p14:creationId xmlns:p14="http://schemas.microsoft.com/office/powerpoint/2010/main" val="2858763483"/>
       </p:ext>
     </p:extLst>
   </p:cSld>
@@ -554,13 +498,7 @@
       </p:grpSpPr>
       <p:sp>
         <p:nvSpPr>
-          <p:cNvPr id="2" name="Vertical Title 1">
-            <a:extLst>
-              <a:ext uri="{FF2B5EF4-FFF2-40B4-BE49-F238E27FC236}">
-                <a16:creationId xmlns:a16="http://schemas.microsoft.com/office/drawing/2014/main" id="{A0F1B002-21DF-BFD4-0B1B-2934F357F1F7}"/>
-              </a:ext>
-            </a:extLst>
-          </p:cNvPr>
+          <p:cNvPr id="2" name="Vertical Title 1"/>
           <p:cNvSpPr>
             <a:spLocks noGrp="1"/>
           </p:cNvSpPr>
@@ -570,8 +508,8 @@
         </p:nvSpPr>
         <p:spPr>
           <a:xfrm>
-            <a:off x="8724900" y="365125"/>
-            <a:ext cx="2628900" cy="5811838"/>
+            <a:off x="6543675" y="365125"/>
+            <a:ext cx="1971675" cy="5811838"/>
           </a:xfrm>
         </p:spPr>
         <p:txBody>
@@ -582,18 +520,13 @@
               <a:rPr lang="en-US"/>
               <a:t>Click to edit Master title style</a:t>
             </a:r>
-          </a:p>
-        </p:txBody>
-      </p:sp>
-      <p:sp>
-        <p:nvSpPr>
-          <p:cNvPr id="3" name="Vertical Text Placeholder 2">
-            <a:extLst>
-              <a:ext uri="{FF2B5EF4-FFF2-40B4-BE49-F238E27FC236}">
-                <a16:creationId xmlns:a16="http://schemas.microsoft.com/office/drawing/2014/main" id="{CCFAB60F-DC4B-5AFD-3AB7-86E27328E321}"/>
-              </a:ext>
-            </a:extLst>
-          </p:cNvPr>
+            <a:endParaRPr lang="en-US" dirty="0"/>
+          </a:p>
+        </p:txBody>
+      </p:sp>
+      <p:sp>
+        <p:nvSpPr>
+          <p:cNvPr id="3" name="Vertical Text Placeholder 2"/>
           <p:cNvSpPr>
             <a:spLocks noGrp="1"/>
           </p:cNvSpPr>
@@ -603,8 +536,8 @@
         </p:nvSpPr>
         <p:spPr>
           <a:xfrm>
-            <a:off x="838200" y="365125"/>
-            <a:ext cx="7734300" cy="5811838"/>
+            <a:off x="628650" y="365125"/>
+            <a:ext cx="5800725" cy="5811838"/>
           </a:xfrm>
         </p:spPr>
         <p:txBody>
@@ -644,18 +577,13 @@
               <a:rPr lang="en-US"/>
               <a:t>Fifth level</a:t>
             </a:r>
-          </a:p>
-        </p:txBody>
-      </p:sp>
-      <p:sp>
-        <p:nvSpPr>
-          <p:cNvPr id="4" name="Date Placeholder 3">
-            <a:extLst>
-              <a:ext uri="{FF2B5EF4-FFF2-40B4-BE49-F238E27FC236}">
-                <a16:creationId xmlns:a16="http://schemas.microsoft.com/office/drawing/2014/main" id="{91B19522-643D-8EF8-4901-B21349826E98}"/>
-              </a:ext>
-            </a:extLst>
-          </p:cNvPr>
+            <a:endParaRPr lang="en-US" dirty="0"/>
+          </a:p>
+        </p:txBody>
+      </p:sp>
+      <p:sp>
+        <p:nvSpPr>
+          <p:cNvPr id="4" name="Date Placeholder 3"/>
           <p:cNvSpPr>
             <a:spLocks noGrp="1"/>
           </p:cNvSpPr>
@@ -678,13 +606,7 @@
       </p:sp>
       <p:sp>
         <p:nvSpPr>
-          <p:cNvPr id="5" name="Footer Placeholder 4">
-            <a:extLst>
-              <a:ext uri="{FF2B5EF4-FFF2-40B4-BE49-F238E27FC236}">
-                <a16:creationId xmlns:a16="http://schemas.microsoft.com/office/drawing/2014/main" id="{B3A5C047-D24E-7902-86D7-3AEFA6F4AEB8}"/>
-              </a:ext>
-            </a:extLst>
-          </p:cNvPr>
+          <p:cNvPr id="5" name="Footer Placeholder 4"/>
           <p:cNvSpPr>
             <a:spLocks noGrp="1"/>
           </p:cNvSpPr>
@@ -703,13 +625,7 @@
       </p:sp>
       <p:sp>
         <p:nvSpPr>
-          <p:cNvPr id="6" name="Slide Number Placeholder 5">
-            <a:extLst>
-              <a:ext uri="{FF2B5EF4-FFF2-40B4-BE49-F238E27FC236}">
-                <a16:creationId xmlns:a16="http://schemas.microsoft.com/office/drawing/2014/main" id="{CC157065-C4C1-CAC8-85A8-A8CE8B9331F4}"/>
-              </a:ext>
-            </a:extLst>
-          </p:cNvPr>
+          <p:cNvPr id="6" name="Slide Number Placeholder 5"/>
           <p:cNvSpPr>
             <a:spLocks noGrp="1"/>
           </p:cNvSpPr>
@@ -733,7 +649,7 @@
     </p:spTree>
     <p:extLst>
       <p:ext uri="{BB962C8B-B14F-4D97-AF65-F5344CB8AC3E}">
-        <p14:creationId xmlns:p14="http://schemas.microsoft.com/office/powerpoint/2010/main" val="2125039412"/>
+        <p14:creationId xmlns:p14="http://schemas.microsoft.com/office/powerpoint/2010/main" val="3571900764"/>
       </p:ext>
     </p:extLst>
   </p:cSld>
@@ -762,13 +678,7 @@
       </p:grpSpPr>
       <p:sp>
         <p:nvSpPr>
-          <p:cNvPr id="2" name="Title 1">
-            <a:extLst>
-              <a:ext uri="{FF2B5EF4-FFF2-40B4-BE49-F238E27FC236}">
-                <a16:creationId xmlns:a16="http://schemas.microsoft.com/office/drawing/2014/main" id="{968196B8-0DB9-8C61-FAD4-67714CE0E7F2}"/>
-              </a:ext>
-            </a:extLst>
-          </p:cNvPr>
+          <p:cNvPr id="2" name="Title 1"/>
           <p:cNvSpPr>
             <a:spLocks noGrp="1"/>
           </p:cNvSpPr>
@@ -785,18 +695,13 @@
               <a:rPr lang="en-US"/>
               <a:t>Click to edit Master title style</a:t>
             </a:r>
-          </a:p>
-        </p:txBody>
-      </p:sp>
-      <p:sp>
-        <p:nvSpPr>
-          <p:cNvPr id="3" name="Content Placeholder 2">
-            <a:extLst>
-              <a:ext uri="{FF2B5EF4-FFF2-40B4-BE49-F238E27FC236}">
-                <a16:creationId xmlns:a16="http://schemas.microsoft.com/office/drawing/2014/main" id="{2968C54A-FE25-F9C5-9006-06EA75119929}"/>
-              </a:ext>
-            </a:extLst>
-          </p:cNvPr>
+            <a:endParaRPr lang="en-US" dirty="0"/>
+          </a:p>
+        </p:txBody>
+      </p:sp>
+      <p:sp>
+        <p:nvSpPr>
+          <p:cNvPr id="3" name="Content Placeholder 2"/>
           <p:cNvSpPr>
             <a:spLocks noGrp="1"/>
           </p:cNvSpPr>
@@ -842,18 +747,13 @@
               <a:rPr lang="en-US"/>
               <a:t>Fifth level</a:t>
             </a:r>
-          </a:p>
-        </p:txBody>
-      </p:sp>
-      <p:sp>
-        <p:nvSpPr>
-          <p:cNvPr id="4" name="Date Placeholder 3">
-            <a:extLst>
-              <a:ext uri="{FF2B5EF4-FFF2-40B4-BE49-F238E27FC236}">
-                <a16:creationId xmlns:a16="http://schemas.microsoft.com/office/drawing/2014/main" id="{76CB1BDD-99BF-6A06-F9BB-E062165F1A5C}"/>
-              </a:ext>
-            </a:extLst>
-          </p:cNvPr>
+            <a:endParaRPr lang="en-US" dirty="0"/>
+          </a:p>
+        </p:txBody>
+      </p:sp>
+      <p:sp>
+        <p:nvSpPr>
+          <p:cNvPr id="4" name="Date Placeholder 3"/>
           <p:cNvSpPr>
             <a:spLocks noGrp="1"/>
           </p:cNvSpPr>
@@ -876,13 +776,7 @@
       </p:sp>
       <p:sp>
         <p:nvSpPr>
-          <p:cNvPr id="5" name="Footer Placeholder 4">
-            <a:extLst>
-              <a:ext uri="{FF2B5EF4-FFF2-40B4-BE49-F238E27FC236}">
-                <a16:creationId xmlns:a16="http://schemas.microsoft.com/office/drawing/2014/main" id="{29F0F9AC-B77F-A020-5B52-55A449C8DD10}"/>
-              </a:ext>
-            </a:extLst>
-          </p:cNvPr>
+          <p:cNvPr id="5" name="Footer Placeholder 4"/>
           <p:cNvSpPr>
             <a:spLocks noGrp="1"/>
           </p:cNvSpPr>
@@ -901,13 +795,7 @@
       </p:sp>
       <p:sp>
         <p:nvSpPr>
-          <p:cNvPr id="6" name="Slide Number Placeholder 5">
-            <a:extLst>
-              <a:ext uri="{FF2B5EF4-FFF2-40B4-BE49-F238E27FC236}">
-                <a16:creationId xmlns:a16="http://schemas.microsoft.com/office/drawing/2014/main" id="{7B6D9C4F-123E-0892-8602-DDD29935F673}"/>
-              </a:ext>
-            </a:extLst>
-          </p:cNvPr>
+          <p:cNvPr id="6" name="Slide Number Placeholder 5"/>
           <p:cNvSpPr>
             <a:spLocks noGrp="1"/>
           </p:cNvSpPr>
@@ -931,7 +819,7 @@
     </p:spTree>
     <p:extLst>
       <p:ext uri="{BB962C8B-B14F-4D97-AF65-F5344CB8AC3E}">
-        <p14:creationId xmlns:p14="http://schemas.microsoft.com/office/powerpoint/2010/main" val="1944330409"/>
+        <p14:creationId xmlns:p14="http://schemas.microsoft.com/office/powerpoint/2010/main" val="2145329998"/>
       </p:ext>
     </p:extLst>
   </p:cSld>
@@ -960,13 +848,7 @@
       </p:grpSpPr>
       <p:sp>
         <p:nvSpPr>
-          <p:cNvPr id="2" name="Title 1">
-            <a:extLst>
-              <a:ext uri="{FF2B5EF4-FFF2-40B4-BE49-F238E27FC236}">
-                <a16:creationId xmlns:a16="http://schemas.microsoft.com/office/drawing/2014/main" id="{6B99D8D1-6315-2388-CF4E-06FE9E9DDE59}"/>
-              </a:ext>
-            </a:extLst>
-          </p:cNvPr>
+          <p:cNvPr id="2" name="Title 1"/>
           <p:cNvSpPr>
             <a:spLocks noGrp="1"/>
           </p:cNvSpPr>
@@ -976,8 +858,8 @@
         </p:nvSpPr>
         <p:spPr>
           <a:xfrm>
-            <a:off x="831850" y="1709738"/>
-            <a:ext cx="10515600" cy="2852737"/>
+            <a:off x="623888" y="1709739"/>
+            <a:ext cx="7886700" cy="2852737"/>
           </a:xfrm>
         </p:spPr>
         <p:txBody>
@@ -992,18 +874,13 @@
               <a:rPr lang="en-US"/>
               <a:t>Click to edit Master title style</a:t>
             </a:r>
-          </a:p>
-        </p:txBody>
-      </p:sp>
-      <p:sp>
-        <p:nvSpPr>
-          <p:cNvPr id="3" name="Text Placeholder 2">
-            <a:extLst>
-              <a:ext uri="{FF2B5EF4-FFF2-40B4-BE49-F238E27FC236}">
-                <a16:creationId xmlns:a16="http://schemas.microsoft.com/office/drawing/2014/main" id="{039A3C31-FFEB-0DB2-CFA2-03537C12722D}"/>
-              </a:ext>
-            </a:extLst>
-          </p:cNvPr>
+            <a:endParaRPr lang="en-US" dirty="0"/>
+          </a:p>
+        </p:txBody>
+      </p:sp>
+      <p:sp>
+        <p:nvSpPr>
+          <p:cNvPr id="3" name="Text Placeholder 2"/>
           <p:cNvSpPr>
             <a:spLocks noGrp="1"/>
           </p:cNvSpPr>
@@ -1013,8 +890,8 @@
         </p:nvSpPr>
         <p:spPr>
           <a:xfrm>
-            <a:off x="831850" y="4589463"/>
-            <a:ext cx="10515600" cy="1500187"/>
+            <a:off x="623888" y="4589464"/>
+            <a:ext cx="7886700" cy="1500187"/>
           </a:xfrm>
         </p:spPr>
         <p:txBody>
@@ -1024,9 +901,7 @@
               <a:buNone/>
               <a:defRPr sz="2400">
                 <a:solidFill>
-                  <a:schemeClr val="tx1">
-                    <a:tint val="75000"/>
-                  </a:schemeClr>
+                  <a:schemeClr val="tx1"/>
                 </a:solidFill>
               </a:defRPr>
             </a:lvl1pPr>
@@ -1122,13 +997,7 @@
       </p:sp>
       <p:sp>
         <p:nvSpPr>
-          <p:cNvPr id="4" name="Date Placeholder 3">
-            <a:extLst>
-              <a:ext uri="{FF2B5EF4-FFF2-40B4-BE49-F238E27FC236}">
-                <a16:creationId xmlns:a16="http://schemas.microsoft.com/office/drawing/2014/main" id="{F20732C8-2E4A-D1D8-AF3C-65525584576F}"/>
-              </a:ext>
-            </a:extLst>
-          </p:cNvPr>
+          <p:cNvPr id="4" name="Date Placeholder 3"/>
           <p:cNvSpPr>
             <a:spLocks noGrp="1"/>
           </p:cNvSpPr>
@@ -1151,13 +1020,7 @@
       </p:sp>
       <p:sp>
         <p:nvSpPr>
-          <p:cNvPr id="5" name="Footer Placeholder 4">
-            <a:extLst>
-              <a:ext uri="{FF2B5EF4-FFF2-40B4-BE49-F238E27FC236}">
-                <a16:creationId xmlns:a16="http://schemas.microsoft.com/office/drawing/2014/main" id="{25E0704A-4AEF-D38F-4DF8-85D549D32391}"/>
-              </a:ext>
-            </a:extLst>
-          </p:cNvPr>
+          <p:cNvPr id="5" name="Footer Placeholder 4"/>
           <p:cNvSpPr>
             <a:spLocks noGrp="1"/>
           </p:cNvSpPr>
@@ -1176,13 +1039,7 @@
       </p:sp>
       <p:sp>
         <p:nvSpPr>
-          <p:cNvPr id="6" name="Slide Number Placeholder 5">
-            <a:extLst>
-              <a:ext uri="{FF2B5EF4-FFF2-40B4-BE49-F238E27FC236}">
-                <a16:creationId xmlns:a16="http://schemas.microsoft.com/office/drawing/2014/main" id="{35A5EE82-AB53-04CE-0938-06B5CFF34C0E}"/>
-              </a:ext>
-            </a:extLst>
-          </p:cNvPr>
+          <p:cNvPr id="6" name="Slide Number Placeholder 5"/>
           <p:cNvSpPr>
             <a:spLocks noGrp="1"/>
           </p:cNvSpPr>
@@ -1206,7 +1063,7 @@
     </p:spTree>
     <p:extLst>
       <p:ext uri="{BB962C8B-B14F-4D97-AF65-F5344CB8AC3E}">
-        <p14:creationId xmlns:p14="http://schemas.microsoft.com/office/powerpoint/2010/main" val="3092253152"/>
+        <p14:creationId xmlns:p14="http://schemas.microsoft.com/office/powerpoint/2010/main" val="3656535670"/>
       </p:ext>
     </p:extLst>
   </p:cSld>
@@ -1235,13 +1092,7 @@
       </p:grpSpPr>
       <p:sp>
         <p:nvSpPr>
-          <p:cNvPr id="2" name="Title 1">
-            <a:extLst>
-              <a:ext uri="{FF2B5EF4-FFF2-40B4-BE49-F238E27FC236}">
-                <a16:creationId xmlns:a16="http://schemas.microsoft.com/office/drawing/2014/main" id="{D193894D-B2CF-715C-0799-48D4D823200E}"/>
-              </a:ext>
-            </a:extLst>
-          </p:cNvPr>
+          <p:cNvPr id="2" name="Title 1"/>
           <p:cNvSpPr>
             <a:spLocks noGrp="1"/>
           </p:cNvSpPr>
@@ -1258,18 +1109,13 @@
               <a:rPr lang="en-US"/>
               <a:t>Click to edit Master title style</a:t>
             </a:r>
-          </a:p>
-        </p:txBody>
-      </p:sp>
-      <p:sp>
-        <p:nvSpPr>
-          <p:cNvPr id="3" name="Content Placeholder 2">
-            <a:extLst>
-              <a:ext uri="{FF2B5EF4-FFF2-40B4-BE49-F238E27FC236}">
-                <a16:creationId xmlns:a16="http://schemas.microsoft.com/office/drawing/2014/main" id="{E15E2A7C-0D30-A8BD-E028-8175C75485C8}"/>
-              </a:ext>
-            </a:extLst>
-          </p:cNvPr>
+            <a:endParaRPr lang="en-US" dirty="0"/>
+          </a:p>
+        </p:txBody>
+      </p:sp>
+      <p:sp>
+        <p:nvSpPr>
+          <p:cNvPr id="3" name="Content Placeholder 2"/>
           <p:cNvSpPr>
             <a:spLocks noGrp="1"/>
           </p:cNvSpPr>
@@ -1279,8 +1125,8 @@
         </p:nvSpPr>
         <p:spPr>
           <a:xfrm>
-            <a:off x="838200" y="1825625"/>
-            <a:ext cx="5181600" cy="4351338"/>
+            <a:off x="628650" y="1825625"/>
+            <a:ext cx="3886200" cy="4351338"/>
           </a:xfrm>
         </p:spPr>
         <p:txBody>
@@ -1320,18 +1166,13 @@
               <a:rPr lang="en-US"/>
               <a:t>Fifth level</a:t>
             </a:r>
-          </a:p>
-        </p:txBody>
-      </p:sp>
-      <p:sp>
-        <p:nvSpPr>
-          <p:cNvPr id="4" name="Content Placeholder 3">
-            <a:extLst>
-              <a:ext uri="{FF2B5EF4-FFF2-40B4-BE49-F238E27FC236}">
-                <a16:creationId xmlns:a16="http://schemas.microsoft.com/office/drawing/2014/main" id="{810BE591-3E84-362E-7FB7-6A25A147A185}"/>
-              </a:ext>
-            </a:extLst>
-          </p:cNvPr>
+            <a:endParaRPr lang="en-US" dirty="0"/>
+          </a:p>
+        </p:txBody>
+      </p:sp>
+      <p:sp>
+        <p:nvSpPr>
+          <p:cNvPr id="4" name="Content Placeholder 3"/>
           <p:cNvSpPr>
             <a:spLocks noGrp="1"/>
           </p:cNvSpPr>
@@ -1341,8 +1182,8 @@
         </p:nvSpPr>
         <p:spPr>
           <a:xfrm>
-            <a:off x="6172200" y="1825625"/>
-            <a:ext cx="5181600" cy="4351338"/>
+            <a:off x="4629150" y="1825625"/>
+            <a:ext cx="3886200" cy="4351338"/>
           </a:xfrm>
         </p:spPr>
         <p:txBody>
@@ -1382,18 +1223,13 @@
               <a:rPr lang="en-US"/>
               <a:t>Fifth level</a:t>
             </a:r>
-          </a:p>
-        </p:txBody>
-      </p:sp>
-      <p:sp>
-        <p:nvSpPr>
-          <p:cNvPr id="5" name="Date Placeholder 4">
-            <a:extLst>
-              <a:ext uri="{FF2B5EF4-FFF2-40B4-BE49-F238E27FC236}">
-                <a16:creationId xmlns:a16="http://schemas.microsoft.com/office/drawing/2014/main" id="{9F49FD19-33FB-F57D-68D4-4FEF4021E128}"/>
-              </a:ext>
-            </a:extLst>
-          </p:cNvPr>
+            <a:endParaRPr lang="en-US" dirty="0"/>
+          </a:p>
+        </p:txBody>
+      </p:sp>
+      <p:sp>
+        <p:nvSpPr>
+          <p:cNvPr id="5" name="Date Placeholder 4"/>
           <p:cNvSpPr>
             <a:spLocks noGrp="1"/>
           </p:cNvSpPr>
@@ -1416,13 +1252,7 @@
       </p:sp>
       <p:sp>
         <p:nvSpPr>
-          <p:cNvPr id="6" name="Footer Placeholder 5">
-            <a:extLst>
-              <a:ext uri="{FF2B5EF4-FFF2-40B4-BE49-F238E27FC236}">
-                <a16:creationId xmlns:a16="http://schemas.microsoft.com/office/drawing/2014/main" id="{39B03DCA-3850-633D-45C9-A930C6DDC733}"/>
-              </a:ext>
-            </a:extLst>
-          </p:cNvPr>
+          <p:cNvPr id="6" name="Footer Placeholder 5"/>
           <p:cNvSpPr>
             <a:spLocks noGrp="1"/>
           </p:cNvSpPr>
@@ -1441,13 +1271,7 @@
       </p:sp>
       <p:sp>
         <p:nvSpPr>
-          <p:cNvPr id="7" name="Slide Number Placeholder 6">
-            <a:extLst>
-              <a:ext uri="{FF2B5EF4-FFF2-40B4-BE49-F238E27FC236}">
-                <a16:creationId xmlns:a16="http://schemas.microsoft.com/office/drawing/2014/main" id="{0D046F6D-9139-8EED-02E5-EB2341941597}"/>
-              </a:ext>
-            </a:extLst>
-          </p:cNvPr>
+          <p:cNvPr id="7" name="Slide Number Placeholder 6"/>
           <p:cNvSpPr>
             <a:spLocks noGrp="1"/>
           </p:cNvSpPr>
@@ -1471,7 +1295,7 @@
     </p:spTree>
     <p:extLst>
       <p:ext uri="{BB962C8B-B14F-4D97-AF65-F5344CB8AC3E}">
-        <p14:creationId xmlns:p14="http://schemas.microsoft.com/office/powerpoint/2010/main" val="2838385331"/>
+        <p14:creationId xmlns:p14="http://schemas.microsoft.com/office/powerpoint/2010/main" val="2985894440"/>
       </p:ext>
     </p:extLst>
   </p:cSld>
@@ -1500,13 +1324,7 @@
       </p:grpSpPr>
       <p:sp>
         <p:nvSpPr>
-          <p:cNvPr id="2" name="Title 1">
-            <a:extLst>
-              <a:ext uri="{FF2B5EF4-FFF2-40B4-BE49-F238E27FC236}">
-                <a16:creationId xmlns:a16="http://schemas.microsoft.com/office/drawing/2014/main" id="{38018665-9BE2-B06D-5A30-9F8E3A8818FD}"/>
-              </a:ext>
-            </a:extLst>
-          </p:cNvPr>
+          <p:cNvPr id="2" name="Title 1"/>
           <p:cNvSpPr>
             <a:spLocks noGrp="1"/>
           </p:cNvSpPr>
@@ -1516,8 +1334,8 @@
         </p:nvSpPr>
         <p:spPr>
           <a:xfrm>
-            <a:off x="839788" y="365125"/>
-            <a:ext cx="10515600" cy="1325563"/>
+            <a:off x="629841" y="365126"/>
+            <a:ext cx="7886700" cy="1325563"/>
           </a:xfrm>
         </p:spPr>
         <p:txBody>
@@ -1528,18 +1346,13 @@
               <a:rPr lang="en-US"/>
               <a:t>Click to edit Master title style</a:t>
             </a:r>
-          </a:p>
-        </p:txBody>
-      </p:sp>
-      <p:sp>
-        <p:nvSpPr>
-          <p:cNvPr id="3" name="Text Placeholder 2">
-            <a:extLst>
-              <a:ext uri="{FF2B5EF4-FFF2-40B4-BE49-F238E27FC236}">
-                <a16:creationId xmlns:a16="http://schemas.microsoft.com/office/drawing/2014/main" id="{B6237FEF-E171-3148-389D-E8995CB28780}"/>
-              </a:ext>
-            </a:extLst>
-          </p:cNvPr>
+            <a:endParaRPr lang="en-US" dirty="0"/>
+          </a:p>
+        </p:txBody>
+      </p:sp>
+      <p:sp>
+        <p:nvSpPr>
+          <p:cNvPr id="3" name="Text Placeholder 2"/>
           <p:cNvSpPr>
             <a:spLocks noGrp="1"/>
           </p:cNvSpPr>
@@ -1549,8 +1362,8 @@
         </p:nvSpPr>
         <p:spPr>
           <a:xfrm>
-            <a:off x="839788" y="1681163"/>
-            <a:ext cx="5157787" cy="823912"/>
+            <a:off x="629842" y="1681163"/>
+            <a:ext cx="3868340" cy="823912"/>
           </a:xfrm>
         </p:spPr>
         <p:txBody>
@@ -1604,13 +1417,7 @@
       </p:sp>
       <p:sp>
         <p:nvSpPr>
-          <p:cNvPr id="4" name="Content Placeholder 3">
-            <a:extLst>
-              <a:ext uri="{FF2B5EF4-FFF2-40B4-BE49-F238E27FC236}">
-                <a16:creationId xmlns:a16="http://schemas.microsoft.com/office/drawing/2014/main" id="{580D297E-9449-8812-AA17-76200DD6F26B}"/>
-              </a:ext>
-            </a:extLst>
-          </p:cNvPr>
+          <p:cNvPr id="4" name="Content Placeholder 3"/>
           <p:cNvSpPr>
             <a:spLocks noGrp="1"/>
           </p:cNvSpPr>
@@ -1620,8 +1427,8 @@
         </p:nvSpPr>
         <p:spPr>
           <a:xfrm>
-            <a:off x="839788" y="2505075"/>
-            <a:ext cx="5157787" cy="3684588"/>
+            <a:off x="629842" y="2505075"/>
+            <a:ext cx="3868340" cy="3684588"/>
           </a:xfrm>
         </p:spPr>
         <p:txBody>
@@ -1661,18 +1468,13 @@
               <a:rPr lang="en-US"/>
               <a:t>Fifth level</a:t>
             </a:r>
-          </a:p>
-        </p:txBody>
-      </p:sp>
-      <p:sp>
-        <p:nvSpPr>
-          <p:cNvPr id="5" name="Text Placeholder 4">
-            <a:extLst>
-              <a:ext uri="{FF2B5EF4-FFF2-40B4-BE49-F238E27FC236}">
-                <a16:creationId xmlns:a16="http://schemas.microsoft.com/office/drawing/2014/main" id="{9E1CF51B-CF19-EA11-46FF-C390809BEFC2}"/>
-              </a:ext>
-            </a:extLst>
-          </p:cNvPr>
+            <a:endParaRPr lang="en-US" dirty="0"/>
+          </a:p>
+        </p:txBody>
+      </p:sp>
+      <p:sp>
+        <p:nvSpPr>
+          <p:cNvPr id="5" name="Text Placeholder 4"/>
           <p:cNvSpPr>
             <a:spLocks noGrp="1"/>
           </p:cNvSpPr>
@@ -1682,8 +1484,8 @@
         </p:nvSpPr>
         <p:spPr>
           <a:xfrm>
-            <a:off x="6172200" y="1681163"/>
-            <a:ext cx="5183188" cy="823912"/>
+            <a:off x="4629150" y="1681163"/>
+            <a:ext cx="3887391" cy="823912"/>
           </a:xfrm>
         </p:spPr>
         <p:txBody>
@@ -1737,13 +1539,7 @@
       </p:sp>
       <p:sp>
         <p:nvSpPr>
-          <p:cNvPr id="6" name="Content Placeholder 5">
-            <a:extLst>
-              <a:ext uri="{FF2B5EF4-FFF2-40B4-BE49-F238E27FC236}">
-                <a16:creationId xmlns:a16="http://schemas.microsoft.com/office/drawing/2014/main" id="{B273D607-CC7E-6C98-08FE-CF19E88C029E}"/>
-              </a:ext>
-            </a:extLst>
-          </p:cNvPr>
+          <p:cNvPr id="6" name="Content Placeholder 5"/>
           <p:cNvSpPr>
             <a:spLocks noGrp="1"/>
           </p:cNvSpPr>
@@ -1753,8 +1549,8 @@
         </p:nvSpPr>
         <p:spPr>
           <a:xfrm>
-            <a:off x="6172200" y="2505075"/>
-            <a:ext cx="5183188" cy="3684588"/>
+            <a:off x="4629150" y="2505075"/>
+            <a:ext cx="3887391" cy="3684588"/>
           </a:xfrm>
         </p:spPr>
         <p:txBody>
@@ -1794,18 +1590,13 @@
               <a:rPr lang="en-US"/>
               <a:t>Fifth level</a:t>
             </a:r>
-          </a:p>
-        </p:txBody>
-      </p:sp>
-      <p:sp>
-        <p:nvSpPr>
-          <p:cNvPr id="7" name="Date Placeholder 6">
-            <a:extLst>
-              <a:ext uri="{FF2B5EF4-FFF2-40B4-BE49-F238E27FC236}">
-                <a16:creationId xmlns:a16="http://schemas.microsoft.com/office/drawing/2014/main" id="{847E919F-3573-ECA5-2DBB-4BC58C49167E}"/>
-              </a:ext>
-            </a:extLst>
-          </p:cNvPr>
+            <a:endParaRPr lang="en-US" dirty="0"/>
+          </a:p>
+        </p:txBody>
+      </p:sp>
+      <p:sp>
+        <p:nvSpPr>
+          <p:cNvPr id="7" name="Date Placeholder 6"/>
           <p:cNvSpPr>
             <a:spLocks noGrp="1"/>
           </p:cNvSpPr>
@@ -1828,13 +1619,7 @@
       </p:sp>
       <p:sp>
         <p:nvSpPr>
-          <p:cNvPr id="8" name="Footer Placeholder 7">
-            <a:extLst>
-              <a:ext uri="{FF2B5EF4-FFF2-40B4-BE49-F238E27FC236}">
-                <a16:creationId xmlns:a16="http://schemas.microsoft.com/office/drawing/2014/main" id="{68224821-3DBF-64D3-5E8B-369A53EF549D}"/>
-              </a:ext>
-            </a:extLst>
-          </p:cNvPr>
+          <p:cNvPr id="8" name="Footer Placeholder 7"/>
           <p:cNvSpPr>
             <a:spLocks noGrp="1"/>
           </p:cNvSpPr>
@@ -1853,13 +1638,7 @@
       </p:sp>
       <p:sp>
         <p:nvSpPr>
-          <p:cNvPr id="9" name="Slide Number Placeholder 8">
-            <a:extLst>
-              <a:ext uri="{FF2B5EF4-FFF2-40B4-BE49-F238E27FC236}">
-                <a16:creationId xmlns:a16="http://schemas.microsoft.com/office/drawing/2014/main" id="{91CAB22E-F451-277D-B709-E58FFF2B3602}"/>
-              </a:ext>
-            </a:extLst>
-          </p:cNvPr>
+          <p:cNvPr id="9" name="Slide Number Placeholder 8"/>
           <p:cNvSpPr>
             <a:spLocks noGrp="1"/>
           </p:cNvSpPr>
@@ -1883,7 +1662,7 @@
     </p:spTree>
     <p:extLst>
       <p:ext uri="{BB962C8B-B14F-4D97-AF65-F5344CB8AC3E}">
-        <p14:creationId xmlns:p14="http://schemas.microsoft.com/office/powerpoint/2010/main" val="1623060025"/>
+        <p14:creationId xmlns:p14="http://schemas.microsoft.com/office/powerpoint/2010/main" val="2441958072"/>
       </p:ext>
     </p:extLst>
   </p:cSld>
@@ -1912,13 +1691,7 @@
       </p:grpSpPr>
       <p:sp>
         <p:nvSpPr>
-          <p:cNvPr id="2" name="Title 1">
-            <a:extLst>
-              <a:ext uri="{FF2B5EF4-FFF2-40B4-BE49-F238E27FC236}">
-                <a16:creationId xmlns:a16="http://schemas.microsoft.com/office/drawing/2014/main" id="{1581025C-94C7-738D-130E-FE41852C13D9}"/>
-              </a:ext>
-            </a:extLst>
-          </p:cNvPr>
+          <p:cNvPr id="2" name="Title 1"/>
           <p:cNvSpPr>
             <a:spLocks noGrp="1"/>
           </p:cNvSpPr>
@@ -1935,18 +1708,13 @@
               <a:rPr lang="en-US"/>
               <a:t>Click to edit Master title style</a:t>
             </a:r>
-          </a:p>
-        </p:txBody>
-      </p:sp>
-      <p:sp>
-        <p:nvSpPr>
-          <p:cNvPr id="3" name="Date Placeholder 2">
-            <a:extLst>
-              <a:ext uri="{FF2B5EF4-FFF2-40B4-BE49-F238E27FC236}">
-                <a16:creationId xmlns:a16="http://schemas.microsoft.com/office/drawing/2014/main" id="{207B29F9-6448-C6F1-D747-9CD9F01A12B9}"/>
-              </a:ext>
-            </a:extLst>
-          </p:cNvPr>
+            <a:endParaRPr lang="en-US" dirty="0"/>
+          </a:p>
+        </p:txBody>
+      </p:sp>
+      <p:sp>
+        <p:nvSpPr>
+          <p:cNvPr id="3" name="Date Placeholder 2"/>
           <p:cNvSpPr>
             <a:spLocks noGrp="1"/>
           </p:cNvSpPr>
@@ -1969,13 +1737,7 @@
       </p:sp>
       <p:sp>
         <p:nvSpPr>
-          <p:cNvPr id="4" name="Footer Placeholder 3">
-            <a:extLst>
-              <a:ext uri="{FF2B5EF4-FFF2-40B4-BE49-F238E27FC236}">
-                <a16:creationId xmlns:a16="http://schemas.microsoft.com/office/drawing/2014/main" id="{80207003-6077-31C9-8FF4-A6883AD63DB8}"/>
-              </a:ext>
-            </a:extLst>
-          </p:cNvPr>
+          <p:cNvPr id="4" name="Footer Placeholder 3"/>
           <p:cNvSpPr>
             <a:spLocks noGrp="1"/>
           </p:cNvSpPr>
@@ -1994,13 +1756,7 @@
       </p:sp>
       <p:sp>
         <p:nvSpPr>
-          <p:cNvPr id="5" name="Slide Number Placeholder 4">
-            <a:extLst>
-              <a:ext uri="{FF2B5EF4-FFF2-40B4-BE49-F238E27FC236}">
-                <a16:creationId xmlns:a16="http://schemas.microsoft.com/office/drawing/2014/main" id="{C78C3211-B73B-B0D4-E8BE-CAA5CBFE6888}"/>
-              </a:ext>
-            </a:extLst>
-          </p:cNvPr>
+          <p:cNvPr id="5" name="Slide Number Placeholder 4"/>
           <p:cNvSpPr>
             <a:spLocks noGrp="1"/>
           </p:cNvSpPr>
@@ -2024,7 +1780,7 @@
     </p:spTree>
     <p:extLst>
       <p:ext uri="{BB962C8B-B14F-4D97-AF65-F5344CB8AC3E}">
-        <p14:creationId xmlns:p14="http://schemas.microsoft.com/office/powerpoint/2010/main" val="532312936"/>
+        <p14:creationId xmlns:p14="http://schemas.microsoft.com/office/powerpoint/2010/main" val="4189309413"/>
       </p:ext>
     </p:extLst>
   </p:cSld>
@@ -2053,13 +1809,7 @@
       </p:grpSpPr>
       <p:sp>
         <p:nvSpPr>
-          <p:cNvPr id="2" name="Date Placeholder 1">
-            <a:extLst>
-              <a:ext uri="{FF2B5EF4-FFF2-40B4-BE49-F238E27FC236}">
-                <a16:creationId xmlns:a16="http://schemas.microsoft.com/office/drawing/2014/main" id="{2E2FA8F3-0492-D3A6-9EAE-7257AED5D90B}"/>
-              </a:ext>
-            </a:extLst>
-          </p:cNvPr>
+          <p:cNvPr id="2" name="Date Placeholder 1"/>
           <p:cNvSpPr>
             <a:spLocks noGrp="1"/>
           </p:cNvSpPr>
@@ -2082,13 +1832,7 @@
       </p:sp>
       <p:sp>
         <p:nvSpPr>
-          <p:cNvPr id="3" name="Footer Placeholder 2">
-            <a:extLst>
-              <a:ext uri="{FF2B5EF4-FFF2-40B4-BE49-F238E27FC236}">
-                <a16:creationId xmlns:a16="http://schemas.microsoft.com/office/drawing/2014/main" id="{B964D942-85A4-4AEF-8C04-9D4AD7C8DC75}"/>
-              </a:ext>
-            </a:extLst>
-          </p:cNvPr>
+          <p:cNvPr id="3" name="Footer Placeholder 2"/>
           <p:cNvSpPr>
             <a:spLocks noGrp="1"/>
           </p:cNvSpPr>
@@ -2107,13 +1851,7 @@
       </p:sp>
       <p:sp>
         <p:nvSpPr>
-          <p:cNvPr id="4" name="Slide Number Placeholder 3">
-            <a:extLst>
-              <a:ext uri="{FF2B5EF4-FFF2-40B4-BE49-F238E27FC236}">
-                <a16:creationId xmlns:a16="http://schemas.microsoft.com/office/drawing/2014/main" id="{5102CCC3-6FEE-2693-9E48-750368FAC013}"/>
-              </a:ext>
-            </a:extLst>
-          </p:cNvPr>
+          <p:cNvPr id="4" name="Slide Number Placeholder 3"/>
           <p:cNvSpPr>
             <a:spLocks noGrp="1"/>
           </p:cNvSpPr>
@@ -2137,7 +1875,7 @@
     </p:spTree>
     <p:extLst>
       <p:ext uri="{BB962C8B-B14F-4D97-AF65-F5344CB8AC3E}">
-        <p14:creationId xmlns:p14="http://schemas.microsoft.com/office/powerpoint/2010/main" val="3040637714"/>
+        <p14:creationId xmlns:p14="http://schemas.microsoft.com/office/powerpoint/2010/main" val="1927775675"/>
       </p:ext>
     </p:extLst>
   </p:cSld>
@@ -2166,13 +1904,7 @@
       </p:grpSpPr>
       <p:sp>
         <p:nvSpPr>
-          <p:cNvPr id="2" name="Title 1">
-            <a:extLst>
-              <a:ext uri="{FF2B5EF4-FFF2-40B4-BE49-F238E27FC236}">
-                <a16:creationId xmlns:a16="http://schemas.microsoft.com/office/drawing/2014/main" id="{D108B1BC-A0D1-993A-AB56-92657BD14867}"/>
-              </a:ext>
-            </a:extLst>
-          </p:cNvPr>
+          <p:cNvPr id="2" name="Title 1"/>
           <p:cNvSpPr>
             <a:spLocks noGrp="1"/>
           </p:cNvSpPr>
@@ -2182,8 +1914,8 @@
         </p:nvSpPr>
         <p:spPr>
           <a:xfrm>
-            <a:off x="839788" y="457200"/>
-            <a:ext cx="3932237" cy="1600200"/>
+            <a:off x="629841" y="457200"/>
+            <a:ext cx="2949178" cy="1600200"/>
           </a:xfrm>
         </p:spPr>
         <p:txBody>
@@ -2198,18 +1930,13 @@
               <a:rPr lang="en-US"/>
               <a:t>Click to edit Master title style</a:t>
             </a:r>
-          </a:p>
-        </p:txBody>
-      </p:sp>
-      <p:sp>
-        <p:nvSpPr>
-          <p:cNvPr id="3" name="Content Placeholder 2">
-            <a:extLst>
-              <a:ext uri="{FF2B5EF4-FFF2-40B4-BE49-F238E27FC236}">
-                <a16:creationId xmlns:a16="http://schemas.microsoft.com/office/drawing/2014/main" id="{66E55302-7757-C527-FDCA-956F72D16EF6}"/>
-              </a:ext>
-            </a:extLst>
-          </p:cNvPr>
+            <a:endParaRPr lang="en-US" dirty="0"/>
+          </a:p>
+        </p:txBody>
+      </p:sp>
+      <p:sp>
+        <p:nvSpPr>
+          <p:cNvPr id="3" name="Content Placeholder 2"/>
           <p:cNvSpPr>
             <a:spLocks noGrp="1"/>
           </p:cNvSpPr>
@@ -2219,8 +1946,8 @@
         </p:nvSpPr>
         <p:spPr>
           <a:xfrm>
-            <a:off x="5183188" y="987425"/>
-            <a:ext cx="6172200" cy="4873625"/>
+            <a:off x="3887391" y="987426"/>
+            <a:ext cx="4629150" cy="4873625"/>
           </a:xfrm>
         </p:spPr>
         <p:txBody>
@@ -2288,18 +2015,13 @@
               <a:rPr lang="en-US"/>
               <a:t>Fifth level</a:t>
             </a:r>
-          </a:p>
-        </p:txBody>
-      </p:sp>
-      <p:sp>
-        <p:nvSpPr>
-          <p:cNvPr id="4" name="Text Placeholder 3">
-            <a:extLst>
-              <a:ext uri="{FF2B5EF4-FFF2-40B4-BE49-F238E27FC236}">
-                <a16:creationId xmlns:a16="http://schemas.microsoft.com/office/drawing/2014/main" id="{B8F9DE12-9A90-CE8C-98A2-BBABE4AF246C}"/>
-              </a:ext>
-            </a:extLst>
-          </p:cNvPr>
+            <a:endParaRPr lang="en-US" dirty="0"/>
+          </a:p>
+        </p:txBody>
+      </p:sp>
+      <p:sp>
+        <p:nvSpPr>
+          <p:cNvPr id="4" name="Text Placeholder 3"/>
           <p:cNvSpPr>
             <a:spLocks noGrp="1"/>
           </p:cNvSpPr>
@@ -2309,8 +2031,8 @@
         </p:nvSpPr>
         <p:spPr>
           <a:xfrm>
-            <a:off x="839788" y="2057400"/>
-            <a:ext cx="3932237" cy="3811588"/>
+            <a:off x="629841" y="2057400"/>
+            <a:ext cx="2949178" cy="3811588"/>
           </a:xfrm>
         </p:spPr>
         <p:txBody>
@@ -2364,13 +2086,7 @@
       </p:sp>
       <p:sp>
         <p:nvSpPr>
-          <p:cNvPr id="5" name="Date Placeholder 4">
-            <a:extLst>
-              <a:ext uri="{FF2B5EF4-FFF2-40B4-BE49-F238E27FC236}">
-                <a16:creationId xmlns:a16="http://schemas.microsoft.com/office/drawing/2014/main" id="{9AE79F78-A0BD-6A8A-10D0-E318FCBD9D18}"/>
-              </a:ext>
-            </a:extLst>
-          </p:cNvPr>
+          <p:cNvPr id="5" name="Date Placeholder 4"/>
           <p:cNvSpPr>
             <a:spLocks noGrp="1"/>
           </p:cNvSpPr>
@@ -2393,13 +2109,7 @@
       </p:sp>
       <p:sp>
         <p:nvSpPr>
-          <p:cNvPr id="6" name="Footer Placeholder 5">
-            <a:extLst>
-              <a:ext uri="{FF2B5EF4-FFF2-40B4-BE49-F238E27FC236}">
-                <a16:creationId xmlns:a16="http://schemas.microsoft.com/office/drawing/2014/main" id="{4D6F40AC-A534-6BF8-AB30-4B8B22914DEB}"/>
-              </a:ext>
-            </a:extLst>
-          </p:cNvPr>
+          <p:cNvPr id="6" name="Footer Placeholder 5"/>
           <p:cNvSpPr>
             <a:spLocks noGrp="1"/>
           </p:cNvSpPr>
@@ -2418,13 +2128,7 @@
       </p:sp>
       <p:sp>
         <p:nvSpPr>
-          <p:cNvPr id="7" name="Slide Number Placeholder 6">
-            <a:extLst>
-              <a:ext uri="{FF2B5EF4-FFF2-40B4-BE49-F238E27FC236}">
-                <a16:creationId xmlns:a16="http://schemas.microsoft.com/office/drawing/2014/main" id="{48F644EC-3188-5354-675A-E22918AE3AE5}"/>
-              </a:ext>
-            </a:extLst>
-          </p:cNvPr>
+          <p:cNvPr id="7" name="Slide Number Placeholder 6"/>
           <p:cNvSpPr>
             <a:spLocks noGrp="1"/>
           </p:cNvSpPr>
@@ -2448,7 +2152,7 @@
     </p:spTree>
     <p:extLst>
       <p:ext uri="{BB962C8B-B14F-4D97-AF65-F5344CB8AC3E}">
-        <p14:creationId xmlns:p14="http://schemas.microsoft.com/office/powerpoint/2010/main" val="844389220"/>
+        <p14:creationId xmlns:p14="http://schemas.microsoft.com/office/powerpoint/2010/main" val="508418991"/>
       </p:ext>
     </p:extLst>
   </p:cSld>
@@ -2477,13 +2181,7 @@
       </p:grpSpPr>
       <p:sp>
         <p:nvSpPr>
-          <p:cNvPr id="2" name="Title 1">
-            <a:extLst>
-              <a:ext uri="{FF2B5EF4-FFF2-40B4-BE49-F238E27FC236}">
-                <a16:creationId xmlns:a16="http://schemas.microsoft.com/office/drawing/2014/main" id="{36F28016-EA2A-F099-7841-3A93664C2964}"/>
-              </a:ext>
-            </a:extLst>
-          </p:cNvPr>
+          <p:cNvPr id="2" name="Title 1"/>
           <p:cNvSpPr>
             <a:spLocks noGrp="1"/>
           </p:cNvSpPr>
@@ -2493,8 +2191,8 @@
         </p:nvSpPr>
         <p:spPr>
           <a:xfrm>
-            <a:off x="839788" y="457200"/>
-            <a:ext cx="3932237" cy="1600200"/>
+            <a:off x="629841" y="457200"/>
+            <a:ext cx="2949178" cy="1600200"/>
           </a:xfrm>
         </p:spPr>
         <p:txBody>
@@ -2509,20 +2207,15 @@
               <a:rPr lang="en-US"/>
               <a:t>Click to edit Master title style</a:t>
             </a:r>
-          </a:p>
-        </p:txBody>
-      </p:sp>
-      <p:sp>
-        <p:nvSpPr>
-          <p:cNvPr id="3" name="Picture Placeholder 2">
-            <a:extLst>
-              <a:ext uri="{FF2B5EF4-FFF2-40B4-BE49-F238E27FC236}">
-                <a16:creationId xmlns:a16="http://schemas.microsoft.com/office/drawing/2014/main" id="{7AE25098-7894-8F10-FC66-3D1718930817}"/>
-              </a:ext>
-            </a:extLst>
-          </p:cNvPr>
-          <p:cNvSpPr>
-            <a:spLocks noGrp="1"/>
+            <a:endParaRPr lang="en-US" dirty="0"/>
+          </a:p>
+        </p:txBody>
+      </p:sp>
+      <p:sp>
+        <p:nvSpPr>
+          <p:cNvPr id="3" name="Picture Placeholder 2"/>
+          <p:cNvSpPr>
+            <a:spLocks noGrp="1" noChangeAspect="1"/>
           </p:cNvSpPr>
           <p:nvPr>
             <p:ph type="pic" idx="1"/>
@@ -2530,12 +2223,12 @@
         </p:nvSpPr>
         <p:spPr>
           <a:xfrm>
-            <a:off x="5183188" y="987425"/>
-            <a:ext cx="6172200" cy="4873625"/>
+            <a:off x="3887391" y="987426"/>
+            <a:ext cx="4629150" cy="4873625"/>
           </a:xfrm>
         </p:spPr>
         <p:txBody>
-          <a:bodyPr/>
+          <a:bodyPr anchor="t"/>
           <a:lstStyle>
             <a:lvl1pPr marL="0" indent="0">
               <a:buNone/>
@@ -2575,19 +2268,17 @@
             </a:lvl9pPr>
           </a:lstStyle>
           <a:p>
-            <a:endParaRPr lang="en-US"/>
-          </a:p>
-        </p:txBody>
-      </p:sp>
-      <p:sp>
-        <p:nvSpPr>
-          <p:cNvPr id="4" name="Text Placeholder 3">
-            <a:extLst>
-              <a:ext uri="{FF2B5EF4-FFF2-40B4-BE49-F238E27FC236}">
-                <a16:creationId xmlns:a16="http://schemas.microsoft.com/office/drawing/2014/main" id="{207E4143-7508-512D-3FCE-6D440695742F}"/>
-              </a:ext>
-            </a:extLst>
-          </p:cNvPr>
+            <a:r>
+              <a:rPr lang="en-US"/>
+              <a:t>Click icon to add picture</a:t>
+            </a:r>
+            <a:endParaRPr lang="en-US" dirty="0"/>
+          </a:p>
+        </p:txBody>
+      </p:sp>
+      <p:sp>
+        <p:nvSpPr>
+          <p:cNvPr id="4" name="Text Placeholder 3"/>
           <p:cNvSpPr>
             <a:spLocks noGrp="1"/>
           </p:cNvSpPr>
@@ -2597,8 +2288,8 @@
         </p:nvSpPr>
         <p:spPr>
           <a:xfrm>
-            <a:off x="839788" y="2057400"/>
-            <a:ext cx="3932237" cy="3811588"/>
+            <a:off x="629841" y="2057400"/>
+            <a:ext cx="2949178" cy="3811588"/>
           </a:xfrm>
         </p:spPr>
         <p:txBody>
@@ -2652,13 +2343,7 @@
       </p:sp>
       <p:sp>
         <p:nvSpPr>
-          <p:cNvPr id="5" name="Date Placeholder 4">
-            <a:extLst>
-              <a:ext uri="{FF2B5EF4-FFF2-40B4-BE49-F238E27FC236}">
-                <a16:creationId xmlns:a16="http://schemas.microsoft.com/office/drawing/2014/main" id="{55EE5F94-606F-48EB-51FD-C9B05B2FDD91}"/>
-              </a:ext>
-            </a:extLst>
-          </p:cNvPr>
+          <p:cNvPr id="5" name="Date Placeholder 4"/>
           <p:cNvSpPr>
             <a:spLocks noGrp="1"/>
           </p:cNvSpPr>
@@ -2681,13 +2366,7 @@
       </p:sp>
       <p:sp>
         <p:nvSpPr>
-          <p:cNvPr id="6" name="Footer Placeholder 5">
-            <a:extLst>
-              <a:ext uri="{FF2B5EF4-FFF2-40B4-BE49-F238E27FC236}">
-                <a16:creationId xmlns:a16="http://schemas.microsoft.com/office/drawing/2014/main" id="{ACB621F5-BEDD-3BC7-645F-16C2E2ABA613}"/>
-              </a:ext>
-            </a:extLst>
-          </p:cNvPr>
+          <p:cNvPr id="6" name="Footer Placeholder 5"/>
           <p:cNvSpPr>
             <a:spLocks noGrp="1"/>
           </p:cNvSpPr>
@@ -2706,13 +2385,7 @@
       </p:sp>
       <p:sp>
         <p:nvSpPr>
-          <p:cNvPr id="7" name="Slide Number Placeholder 6">
-            <a:extLst>
-              <a:ext uri="{FF2B5EF4-FFF2-40B4-BE49-F238E27FC236}">
-                <a16:creationId xmlns:a16="http://schemas.microsoft.com/office/drawing/2014/main" id="{E6040AB1-6933-1C18-E400-048AABDD0642}"/>
-              </a:ext>
-            </a:extLst>
-          </p:cNvPr>
+          <p:cNvPr id="7" name="Slide Number Placeholder 6"/>
           <p:cNvSpPr>
             <a:spLocks noGrp="1"/>
           </p:cNvSpPr>
@@ -2736,7 +2409,7 @@
     </p:spTree>
     <p:extLst>
       <p:ext uri="{BB962C8B-B14F-4D97-AF65-F5344CB8AC3E}">
-        <p14:creationId xmlns:p14="http://schemas.microsoft.com/office/powerpoint/2010/main" val="4042612513"/>
+        <p14:creationId xmlns:p14="http://schemas.microsoft.com/office/powerpoint/2010/main" val="4250743290"/>
       </p:ext>
     </p:extLst>
   </p:cSld>
@@ -2770,13 +2443,7 @@
       </p:grpSpPr>
       <p:sp>
         <p:nvSpPr>
-          <p:cNvPr id="2" name="Title Placeholder 1">
-            <a:extLst>
-              <a:ext uri="{FF2B5EF4-FFF2-40B4-BE49-F238E27FC236}">
-                <a16:creationId xmlns:a16="http://schemas.microsoft.com/office/drawing/2014/main" id="{D07D7F6E-E180-3C4C-1AA6-B816E7B2767A}"/>
-              </a:ext>
-            </a:extLst>
-          </p:cNvPr>
+          <p:cNvPr id="2" name="Title Placeholder 1"/>
           <p:cNvSpPr>
             <a:spLocks noGrp="1"/>
           </p:cNvSpPr>
@@ -2786,8 +2453,8 @@
         </p:nvSpPr>
         <p:spPr>
           <a:xfrm>
-            <a:off x="838200" y="365125"/>
-            <a:ext cx="10515600" cy="1325563"/>
+            <a:off x="628650" y="365126"/>
+            <a:ext cx="7886700" cy="1325563"/>
           </a:xfrm>
           <a:prstGeom prst="rect">
             <a:avLst/>
@@ -2803,18 +2470,13 @@
               <a:rPr lang="en-US"/>
               <a:t>Click to edit Master title style</a:t>
             </a:r>
-          </a:p>
-        </p:txBody>
-      </p:sp>
-      <p:sp>
-        <p:nvSpPr>
-          <p:cNvPr id="3" name="Text Placeholder 2">
-            <a:extLst>
-              <a:ext uri="{FF2B5EF4-FFF2-40B4-BE49-F238E27FC236}">
-                <a16:creationId xmlns:a16="http://schemas.microsoft.com/office/drawing/2014/main" id="{A6FA52F2-4145-04AA-5D58-1910A23CBDC6}"/>
-              </a:ext>
-            </a:extLst>
-          </p:cNvPr>
+            <a:endParaRPr lang="en-US" dirty="0"/>
+          </a:p>
+        </p:txBody>
+      </p:sp>
+      <p:sp>
+        <p:nvSpPr>
+          <p:cNvPr id="3" name="Text Placeholder 2"/>
           <p:cNvSpPr>
             <a:spLocks noGrp="1"/>
           </p:cNvSpPr>
@@ -2824,8 +2486,8 @@
         </p:nvSpPr>
         <p:spPr>
           <a:xfrm>
-            <a:off x="838200" y="1825625"/>
-            <a:ext cx="10515600" cy="4351338"/>
+            <a:off x="628650" y="1825625"/>
+            <a:ext cx="7886700" cy="4351338"/>
           </a:xfrm>
           <a:prstGeom prst="rect">
             <a:avLst/>
@@ -2870,18 +2532,13 @@
               <a:rPr lang="en-US"/>
               <a:t>Fifth level</a:t>
             </a:r>
-          </a:p>
-        </p:txBody>
-      </p:sp>
-      <p:sp>
-        <p:nvSpPr>
-          <p:cNvPr id="4" name="Date Placeholder 3">
-            <a:extLst>
-              <a:ext uri="{FF2B5EF4-FFF2-40B4-BE49-F238E27FC236}">
-                <a16:creationId xmlns:a16="http://schemas.microsoft.com/office/drawing/2014/main" id="{0FFD355E-52B7-92F5-C6A3-F237BFF97399}"/>
-              </a:ext>
-            </a:extLst>
-          </p:cNvPr>
+            <a:endParaRPr lang="en-US" dirty="0"/>
+          </a:p>
+        </p:txBody>
+      </p:sp>
+      <p:sp>
+        <p:nvSpPr>
+          <p:cNvPr id="4" name="Date Placeholder 3"/>
           <p:cNvSpPr>
             <a:spLocks noGrp="1"/>
           </p:cNvSpPr>
@@ -2891,8 +2548,8 @@
         </p:nvSpPr>
         <p:spPr>
           <a:xfrm>
-            <a:off x="838200" y="6356350"/>
-            <a:ext cx="2743200" cy="365125"/>
+            <a:off x="628650" y="6356351"/>
+            <a:ext cx="2057400" cy="365125"/>
           </a:xfrm>
           <a:prstGeom prst="rect">
             <a:avLst/>
@@ -2922,13 +2579,7 @@
       </p:sp>
       <p:sp>
         <p:nvSpPr>
-          <p:cNvPr id="5" name="Footer Placeholder 4">
-            <a:extLst>
-              <a:ext uri="{FF2B5EF4-FFF2-40B4-BE49-F238E27FC236}">
-                <a16:creationId xmlns:a16="http://schemas.microsoft.com/office/drawing/2014/main" id="{643203A7-06D9-B884-9DCC-F48577DFFB8D}"/>
-              </a:ext>
-            </a:extLst>
-          </p:cNvPr>
+          <p:cNvPr id="5" name="Footer Placeholder 4"/>
           <p:cNvSpPr>
             <a:spLocks noGrp="1"/>
           </p:cNvSpPr>
@@ -2938,8 +2589,8 @@
         </p:nvSpPr>
         <p:spPr>
           <a:xfrm>
-            <a:off x="4038600" y="6356350"/>
-            <a:ext cx="4114800" cy="365125"/>
+            <a:off x="3028950" y="6356351"/>
+            <a:ext cx="3086100" cy="365125"/>
           </a:xfrm>
           <a:prstGeom prst="rect">
             <a:avLst/>
@@ -2965,13 +2616,7 @@
       </p:sp>
       <p:sp>
         <p:nvSpPr>
-          <p:cNvPr id="6" name="Slide Number Placeholder 5">
-            <a:extLst>
-              <a:ext uri="{FF2B5EF4-FFF2-40B4-BE49-F238E27FC236}">
-                <a16:creationId xmlns:a16="http://schemas.microsoft.com/office/drawing/2014/main" id="{64998B05-6B78-98CB-053E-F013A0CB80AB}"/>
-              </a:ext>
-            </a:extLst>
-          </p:cNvPr>
+          <p:cNvPr id="6" name="Slide Number Placeholder 5"/>
           <p:cNvSpPr>
             <a:spLocks noGrp="1"/>
           </p:cNvSpPr>
@@ -2981,8 +2626,8 @@
         </p:nvSpPr>
         <p:spPr>
           <a:xfrm>
-            <a:off x="8610600" y="6356350"/>
-            <a:ext cx="2743200" cy="365125"/>
+            <a:off x="6457950" y="6356351"/>
+            <a:ext cx="2057400" cy="365125"/>
           </a:xfrm>
           <a:prstGeom prst="rect">
             <a:avLst/>
@@ -3013,23 +2658,23 @@
     </p:spTree>
     <p:extLst>
       <p:ext uri="{BB962C8B-B14F-4D97-AF65-F5344CB8AC3E}">
-        <p14:creationId xmlns:p14="http://schemas.microsoft.com/office/powerpoint/2010/main" val="3971602815"/>
+        <p14:creationId xmlns:p14="http://schemas.microsoft.com/office/powerpoint/2010/main" val="662205572"/>
       </p:ext>
     </p:extLst>
   </p:cSld>
   <p:clrMap bg1="lt1" tx1="dk1" bg2="lt2" tx2="dk2" accent1="accent1" accent2="accent2" accent3="accent3" accent4="accent4" accent5="accent5" accent6="accent6" hlink="hlink" folHlink="folHlink"/>
   <p:sldLayoutIdLst>
-    <p:sldLayoutId id="2147483649" r:id="rId1"/>
-    <p:sldLayoutId id="2147483650" r:id="rId2"/>
-    <p:sldLayoutId id="2147483651" r:id="rId3"/>
-    <p:sldLayoutId id="2147483652" r:id="rId4"/>
-    <p:sldLayoutId id="2147483653" r:id="rId5"/>
-    <p:sldLayoutId id="2147483654" r:id="rId6"/>
-    <p:sldLayoutId id="2147483655" r:id="rId7"/>
-    <p:sldLayoutId id="2147483656" r:id="rId8"/>
-    <p:sldLayoutId id="2147483657" r:id="rId9"/>
-    <p:sldLayoutId id="2147483658" r:id="rId10"/>
-    <p:sldLayoutId id="2147483659" r:id="rId11"/>
+    <p:sldLayoutId id="2147483661" r:id="rId1"/>
+    <p:sldLayoutId id="2147483662" r:id="rId2"/>
+    <p:sldLayoutId id="2147483663" r:id="rId3"/>
+    <p:sldLayoutId id="2147483664" r:id="rId4"/>
+    <p:sldLayoutId id="2147483665" r:id="rId5"/>
+    <p:sldLayoutId id="2147483666" r:id="rId6"/>
+    <p:sldLayoutId id="2147483667" r:id="rId7"/>
+    <p:sldLayoutId id="2147483668" r:id="rId8"/>
+    <p:sldLayoutId id="2147483669" r:id="rId9"/>
+    <p:sldLayoutId id="2147483670" r:id="rId10"/>
+    <p:sldLayoutId id="2147483671" r:id="rId11"/>
   </p:sldLayoutIdLst>
   <p:txStyles>
     <p:titleStyle>
@@ -3347,24 +2992,29 @@
             <p:ph type="ctrTitle"/>
           </p:nvPr>
         </p:nvSpPr>
-        <p:spPr/>
+        <p:spPr>
+          <a:xfrm>
+            <a:off x="685800" y="-112548"/>
+            <a:ext cx="7772400" cy="2387600"/>
+          </a:xfrm>
+        </p:spPr>
         <p:txBody>
           <a:bodyPr/>
           <a:lstStyle/>
           <a:p>
             <a:r>
               <a:rPr lang="en-US" dirty="0"/>
-              <a:t>Arduino to Headers Shield</a:t>
-            </a:r>
-          </a:p>
-        </p:txBody>
-      </p:sp>
-      <p:sp>
-        <p:nvSpPr>
-          <p:cNvPr id="3" name="Subtitle 2">
+              <a:t>Arduino Shield Circuit Board</a:t>
+            </a:r>
+          </a:p>
+        </p:txBody>
+      </p:sp>
+      <p:sp>
+        <p:nvSpPr>
+          <p:cNvPr id="11" name="Subtitle 2">
             <a:extLst>
               <a:ext uri="{FF2B5EF4-FFF2-40B4-BE49-F238E27FC236}">
-                <a16:creationId xmlns:a16="http://schemas.microsoft.com/office/drawing/2014/main" id="{C5695AF2-559E-3A1E-44D7-75F728D016C5}"/>
+                <a16:creationId xmlns:a16="http://schemas.microsoft.com/office/drawing/2014/main" id="{0070579C-E8C8-5AE9-DBC3-B3CCC536D632}"/>
               </a:ext>
             </a:extLst>
           </p:cNvPr>
@@ -3375,9 +3025,16 @@
             <p:ph type="subTitle" idx="1"/>
           </p:nvPr>
         </p:nvSpPr>
-        <p:spPr/>
-        <p:txBody>
-          <a:bodyPr/>
+        <p:spPr>
+          <a:xfrm>
+            <a:off x="1024497" y="5199968"/>
+            <a:ext cx="6858000" cy="1299814"/>
+          </a:xfrm>
+        </p:spPr>
+        <p:txBody>
+          <a:bodyPr>
+            <a:normAutofit lnSpcReduction="10000"/>
+          </a:bodyPr>
           <a:lstStyle/>
           <a:p>
             <a:r>
@@ -3388,17 +3045,177 @@
           <a:p>
             <a:r>
               <a:rPr lang="en-US" dirty="0"/>
-              <a:t>NIST </a:t>
+              <a:t>NIST</a:t>
             </a:r>
           </a:p>
           <a:p>
             <a:r>
               <a:rPr lang="en-US" dirty="0"/>
-              <a:t>Summer 2024</a:t>
-            </a:r>
-          </a:p>
-        </p:txBody>
-      </p:sp>
+              <a:t>2024</a:t>
+            </a:r>
+          </a:p>
+        </p:txBody>
+      </p:sp>
+      <p:sp>
+        <p:nvSpPr>
+          <p:cNvPr id="12" name="Rectangle: Rounded Corners 11">
+            <a:extLst>
+              <a:ext uri="{FF2B5EF4-FFF2-40B4-BE49-F238E27FC236}">
+                <a16:creationId xmlns:a16="http://schemas.microsoft.com/office/drawing/2014/main" id="{FC19FBF5-6B01-2FA0-6DD6-3B6B20FF2CF1}"/>
+              </a:ext>
+            </a:extLst>
+          </p:cNvPr>
+          <p:cNvSpPr/>
+          <p:nvPr/>
+        </p:nvSpPr>
+        <p:spPr>
+          <a:xfrm>
+            <a:off x="2570080" y="3901768"/>
+            <a:ext cx="3822751" cy="1201746"/>
+          </a:xfrm>
+          <a:prstGeom prst="roundRect">
+            <a:avLst/>
+          </a:prstGeom>
+          <a:ln>
+            <a:solidFill>
+              <a:schemeClr val="tx1"/>
+            </a:solidFill>
+          </a:ln>
+        </p:spPr>
+        <p:style>
+          <a:lnRef idx="3">
+            <a:schemeClr val="lt1"/>
+          </a:lnRef>
+          <a:fillRef idx="1">
+            <a:schemeClr val="accent6"/>
+          </a:fillRef>
+          <a:effectRef idx="1">
+            <a:schemeClr val="accent6"/>
+          </a:effectRef>
+          <a:fontRef idx="minor">
+            <a:schemeClr val="lt1"/>
+          </a:fontRef>
+        </p:style>
+        <p:txBody>
+          <a:bodyPr rtlCol="0" anchor="ctr"/>
+          <a:lstStyle/>
+          <a:p>
+            <a:pPr algn="ctr"/>
+            <a:r>
+              <a:rPr lang="en-US" sz="3300" dirty="0"/>
+              <a:t>MEMSDuino</a:t>
+            </a:r>
+            <a:endParaRPr lang="en-US" sz="1350" dirty="0"/>
+          </a:p>
+        </p:txBody>
+      </p:sp>
+      <p:pic>
+        <p:nvPicPr>
+          <p:cNvPr id="13" name="Picture 12" descr="Icon&#10;&#10;Description automatically generated">
+            <a:extLst>
+              <a:ext uri="{FF2B5EF4-FFF2-40B4-BE49-F238E27FC236}">
+                <a16:creationId xmlns:a16="http://schemas.microsoft.com/office/drawing/2014/main" id="{832BF1DC-6BBD-C91E-CD27-78E7A00893EC}"/>
+              </a:ext>
+            </a:extLst>
+          </p:cNvPr>
+          <p:cNvPicPr>
+            <a:picLocks noChangeAspect="1"/>
+          </p:cNvPicPr>
+          <p:nvPr/>
+        </p:nvPicPr>
+        <p:blipFill>
+          <a:blip r:embed="rId2">
+            <a:extLst>
+              <a:ext uri="{28A0092B-C50C-407E-A947-70E740481C1C}">
+                <a14:useLocalDpi xmlns:a14="http://schemas.microsoft.com/office/drawing/2010/main" val="0"/>
+              </a:ext>
+            </a:extLst>
+          </a:blip>
+          <a:stretch>
+            <a:fillRect/>
+          </a:stretch>
+        </p:blipFill>
+        <p:spPr>
+          <a:xfrm>
+            <a:off x="3989102" y="2692399"/>
+            <a:ext cx="928790" cy="977672"/>
+          </a:xfrm>
+          <a:prstGeom prst="rect">
+            <a:avLst/>
+          </a:prstGeom>
+        </p:spPr>
+      </p:pic>
+      <p:pic>
+        <p:nvPicPr>
+          <p:cNvPr id="14" name="Picture 13" descr="A black and white logo&#10;&#10;Description automatically generated with low confidence">
+            <a:extLst>
+              <a:ext uri="{FF2B5EF4-FFF2-40B4-BE49-F238E27FC236}">
+                <a16:creationId xmlns:a16="http://schemas.microsoft.com/office/drawing/2014/main" id="{FAFA888B-F9AF-667E-191E-ECCC9D18D089}"/>
+              </a:ext>
+            </a:extLst>
+          </p:cNvPr>
+          <p:cNvPicPr>
+            <a:picLocks noChangeAspect="1"/>
+          </p:cNvPicPr>
+          <p:nvPr/>
+        </p:nvPicPr>
+        <p:blipFill>
+          <a:blip r:embed="rId3">
+            <a:extLst>
+              <a:ext uri="{28A0092B-C50C-407E-A947-70E740481C1C}">
+                <a14:useLocalDpi xmlns:a14="http://schemas.microsoft.com/office/drawing/2010/main" val="0"/>
+              </a:ext>
+            </a:extLst>
+          </a:blip>
+          <a:stretch>
+            <a:fillRect/>
+          </a:stretch>
+        </p:blipFill>
+        <p:spPr>
+          <a:xfrm>
+            <a:off x="2430551" y="3025587"/>
+            <a:ext cx="1034048" cy="271496"/>
+          </a:xfrm>
+          <a:prstGeom prst="rect">
+            <a:avLst/>
+          </a:prstGeom>
+        </p:spPr>
+      </p:pic>
+      <p:pic>
+        <p:nvPicPr>
+          <p:cNvPr id="15" name="Picture 14" descr="A picture containing text&#10;&#10;Description automatically generated">
+            <a:extLst>
+              <a:ext uri="{FF2B5EF4-FFF2-40B4-BE49-F238E27FC236}">
+                <a16:creationId xmlns:a16="http://schemas.microsoft.com/office/drawing/2014/main" id="{739F1E93-DA2F-9602-0D93-82DE477AC67D}"/>
+              </a:ext>
+            </a:extLst>
+          </p:cNvPr>
+          <p:cNvPicPr>
+            <a:picLocks noChangeAspect="1"/>
+          </p:cNvPicPr>
+          <p:nvPr/>
+        </p:nvPicPr>
+        <p:blipFill rotWithShape="1">
+          <a:blip r:embed="rId4">
+            <a:extLst>
+              <a:ext uri="{28A0092B-C50C-407E-A947-70E740481C1C}">
+                <a14:useLocalDpi xmlns:a14="http://schemas.microsoft.com/office/drawing/2010/main" val="0"/>
+              </a:ext>
+            </a:extLst>
+          </a:blip>
+          <a:srcRect l="3902" t="14689" r="1836" b="14997"/>
+          <a:stretch/>
+        </p:blipFill>
+        <p:spPr>
+          <a:xfrm>
+            <a:off x="5403131" y="2573750"/>
+            <a:ext cx="1528252" cy="1077296"/>
+          </a:xfrm>
+          <a:prstGeom prst="rect">
+            <a:avLst/>
+          </a:prstGeom>
+        </p:spPr>
+      </p:pic>
     </p:spTree>
     <p:extLst>
       <p:ext uri="{BB962C8B-B14F-4D97-AF65-F5344CB8AC3E}">
@@ -3434,157 +3251,6 @@
           <p:cNvPr id="2" name="Title 1">
             <a:extLst>
               <a:ext uri="{FF2B5EF4-FFF2-40B4-BE49-F238E27FC236}">
-                <a16:creationId xmlns:a16="http://schemas.microsoft.com/office/drawing/2014/main" id="{6F05C22E-B469-5A37-B7BC-F41B88EB44C4}"/>
-              </a:ext>
-            </a:extLst>
-          </p:cNvPr>
-          <p:cNvSpPr>
-            <a:spLocks noGrp="1"/>
-          </p:cNvSpPr>
-          <p:nvPr>
-            <p:ph type="title"/>
-          </p:nvPr>
-        </p:nvSpPr>
-        <p:spPr/>
-        <p:txBody>
-          <a:bodyPr/>
-          <a:lstStyle/>
-          <a:p>
-            <a:r>
-              <a:rPr lang="en-US" dirty="0"/>
-              <a:t>Bill of Materials</a:t>
-            </a:r>
-          </a:p>
-        </p:txBody>
-      </p:sp>
-      <p:sp>
-        <p:nvSpPr>
-          <p:cNvPr id="3" name="Content Placeholder 2">
-            <a:extLst>
-              <a:ext uri="{FF2B5EF4-FFF2-40B4-BE49-F238E27FC236}">
-                <a16:creationId xmlns:a16="http://schemas.microsoft.com/office/drawing/2014/main" id="{4FE00778-5A02-28B4-483E-317062AA2F1D}"/>
-              </a:ext>
-            </a:extLst>
-          </p:cNvPr>
-          <p:cNvSpPr>
-            <a:spLocks noGrp="1"/>
-          </p:cNvSpPr>
-          <p:nvPr>
-            <p:ph idx="1"/>
-          </p:nvPr>
-        </p:nvSpPr>
-        <p:spPr/>
-        <p:txBody>
-          <a:bodyPr>
-            <a:normAutofit lnSpcReduction="10000"/>
-          </a:bodyPr>
-          <a:lstStyle/>
-          <a:p>
-            <a:r>
-              <a:rPr lang="en-US" dirty="0"/>
-              <a:t>PCB Arduino-to-headers-shield</a:t>
-            </a:r>
-          </a:p>
-          <a:p>
-            <a:r>
-              <a:rPr lang="en-US" dirty="0"/>
-              <a:t>0.1” Header strips</a:t>
-            </a:r>
-          </a:p>
-          <a:p>
-            <a:r>
-              <a:rPr lang="en-US" dirty="0"/>
-              <a:t>100 </a:t>
-            </a:r>
-            <a:r>
-              <a:rPr lang="en-US" dirty="0" err="1"/>
-              <a:t>kOhm</a:t>
-            </a:r>
-            <a:r>
-              <a:rPr lang="en-US" dirty="0"/>
-              <a:t> axial resistor</a:t>
-            </a:r>
-          </a:p>
-          <a:p>
-            <a:r>
-              <a:rPr lang="en-US" dirty="0"/>
-              <a:t>330 ohm axial resistor</a:t>
-            </a:r>
-          </a:p>
-          <a:p>
-            <a:r>
-              <a:rPr lang="en-US" dirty="0"/>
-              <a:t>1000 </a:t>
-            </a:r>
-            <a:r>
-              <a:rPr lang="en-US" dirty="0" err="1"/>
-              <a:t>uF</a:t>
-            </a:r>
-            <a:r>
-              <a:rPr lang="en-US" dirty="0"/>
-              <a:t> electrolytic capacitor with greater than 6 V max</a:t>
-            </a:r>
-          </a:p>
-          <a:p>
-            <a:r>
-              <a:rPr lang="en-US" dirty="0"/>
-              <a:t>2, 4 and 8 pin 0.1 inch female </a:t>
-            </a:r>
-            <a:r>
-              <a:rPr lang="en-US"/>
-              <a:t>to female header cables, 6” long</a:t>
-            </a:r>
-            <a:endParaRPr lang="en-US" dirty="0"/>
-          </a:p>
-          <a:p>
-            <a:r>
-              <a:rPr lang="en-US" dirty="0"/>
-              <a:t>Soldering iron and solder</a:t>
-            </a:r>
-          </a:p>
-          <a:p>
-            <a:r>
-              <a:rPr lang="en-US" dirty="0"/>
-              <a:t>An Arduino UNO is useful in assembly for holding pins in place during soldering</a:t>
-            </a:r>
-          </a:p>
-        </p:txBody>
-      </p:sp>
-    </p:spTree>
-    <p:extLst>
-      <p:ext uri="{BB962C8B-B14F-4D97-AF65-F5344CB8AC3E}">
-        <p14:creationId xmlns:p14="http://schemas.microsoft.com/office/powerpoint/2010/main" val="793981740"/>
-      </p:ext>
-    </p:extLst>
-  </p:cSld>
-  <p:clrMapOvr>
-    <a:masterClrMapping/>
-  </p:clrMapOvr>
-</p:sld>
-</file>
-
-<file path=ppt/slides/slide3.xml><?xml version="1.0" encoding="utf-8"?>
-<p:sld xmlns:a="http://schemas.openxmlformats.org/drawingml/2006/main" xmlns:r="http://schemas.openxmlformats.org/officeDocument/2006/relationships" xmlns:p="http://schemas.openxmlformats.org/presentationml/2006/main">
-  <p:cSld>
-    <p:spTree>
-      <p:nvGrpSpPr>
-        <p:cNvPr id="1" name=""/>
-        <p:cNvGrpSpPr/>
-        <p:nvPr/>
-      </p:nvGrpSpPr>
-      <p:grpSpPr>
-        <a:xfrm>
-          <a:off x="0" y="0"/>
-          <a:ext cx="0" cy="0"/>
-          <a:chOff x="0" y="0"/>
-          <a:chExt cx="0" cy="0"/>
-        </a:xfrm>
-      </p:grpSpPr>
-      <p:sp>
-        <p:nvSpPr>
-          <p:cNvPr id="2" name="Title 1">
-            <a:extLst>
-              <a:ext uri="{FF2B5EF4-FFF2-40B4-BE49-F238E27FC236}">
                 <a16:creationId xmlns:a16="http://schemas.microsoft.com/office/drawing/2014/main" id="{196ADD7C-E5D0-1E8A-441A-154C50F478D5}"/>
               </a:ext>
             </a:extLst>
@@ -3636,8 +3302,8 @@
         </p:blipFill>
         <p:spPr>
           <a:xfrm>
-            <a:off x="3417062" y="1809981"/>
-            <a:ext cx="5640679" cy="4652257"/>
+            <a:off x="1823439" y="1090421"/>
+            <a:ext cx="5670870" cy="4677158"/>
           </a:xfrm>
           <a:prstGeom prst="rect">
             <a:avLst/>
@@ -3657,7 +3323,7 @@
 </p:sld>
 </file>
 
-<file path=ppt/slides/slide4.xml><?xml version="1.0" encoding="utf-8"?>
+<file path=ppt/slides/slide3.xml><?xml version="1.0" encoding="utf-8"?>
 <p:sld xmlns:a="http://schemas.openxmlformats.org/drawingml/2006/main" xmlns:r="http://schemas.openxmlformats.org/officeDocument/2006/relationships" xmlns:p="http://schemas.openxmlformats.org/presentationml/2006/main">
   <p:cSld>
     <p:spTree>
@@ -3730,8 +3396,8 @@
         </p:blipFill>
         <p:spPr>
           <a:xfrm>
-            <a:off x="2177422" y="1386243"/>
-            <a:ext cx="6985431" cy="5188953"/>
+            <a:off x="1633068" y="1917940"/>
+            <a:ext cx="5210792" cy="3870707"/>
           </a:xfrm>
           <a:prstGeom prst="rect">
             <a:avLst/>
@@ -3742,6 +3408,157 @@
     <p:extLst>
       <p:ext uri="{BB962C8B-B14F-4D97-AF65-F5344CB8AC3E}">
         <p14:creationId xmlns:p14="http://schemas.microsoft.com/office/powerpoint/2010/main" val="488902115"/>
+      </p:ext>
+    </p:extLst>
+  </p:cSld>
+  <p:clrMapOvr>
+    <a:masterClrMapping/>
+  </p:clrMapOvr>
+</p:sld>
+</file>
+
+<file path=ppt/slides/slide4.xml><?xml version="1.0" encoding="utf-8"?>
+<p:sld xmlns:a="http://schemas.openxmlformats.org/drawingml/2006/main" xmlns:r="http://schemas.openxmlformats.org/officeDocument/2006/relationships" xmlns:p="http://schemas.openxmlformats.org/presentationml/2006/main">
+  <p:cSld>
+    <p:spTree>
+      <p:nvGrpSpPr>
+        <p:cNvPr id="1" name=""/>
+        <p:cNvGrpSpPr/>
+        <p:nvPr/>
+      </p:nvGrpSpPr>
+      <p:grpSpPr>
+        <a:xfrm>
+          <a:off x="0" y="0"/>
+          <a:ext cx="0" cy="0"/>
+          <a:chOff x="0" y="0"/>
+          <a:chExt cx="0" cy="0"/>
+        </a:xfrm>
+      </p:grpSpPr>
+      <p:sp>
+        <p:nvSpPr>
+          <p:cNvPr id="2" name="Title 1">
+            <a:extLst>
+              <a:ext uri="{FF2B5EF4-FFF2-40B4-BE49-F238E27FC236}">
+                <a16:creationId xmlns:a16="http://schemas.microsoft.com/office/drawing/2014/main" id="{6F05C22E-B469-5A37-B7BC-F41B88EB44C4}"/>
+              </a:ext>
+            </a:extLst>
+          </p:cNvPr>
+          <p:cNvSpPr>
+            <a:spLocks noGrp="1"/>
+          </p:cNvSpPr>
+          <p:nvPr>
+            <p:ph type="title"/>
+          </p:nvPr>
+        </p:nvSpPr>
+        <p:spPr/>
+        <p:txBody>
+          <a:bodyPr/>
+          <a:lstStyle/>
+          <a:p>
+            <a:r>
+              <a:rPr lang="en-US" dirty="0"/>
+              <a:t>Bill of Materials</a:t>
+            </a:r>
+          </a:p>
+        </p:txBody>
+      </p:sp>
+      <p:sp>
+        <p:nvSpPr>
+          <p:cNvPr id="3" name="Content Placeholder 2">
+            <a:extLst>
+              <a:ext uri="{FF2B5EF4-FFF2-40B4-BE49-F238E27FC236}">
+                <a16:creationId xmlns:a16="http://schemas.microsoft.com/office/drawing/2014/main" id="{4FE00778-5A02-28B4-483E-317062AA2F1D}"/>
+              </a:ext>
+            </a:extLst>
+          </p:cNvPr>
+          <p:cNvSpPr>
+            <a:spLocks noGrp="1"/>
+          </p:cNvSpPr>
+          <p:nvPr>
+            <p:ph idx="1"/>
+          </p:nvPr>
+        </p:nvSpPr>
+        <p:spPr/>
+        <p:txBody>
+          <a:bodyPr>
+            <a:normAutofit fontScale="92500" lnSpcReduction="20000"/>
+          </a:bodyPr>
+          <a:lstStyle/>
+          <a:p>
+            <a:r>
+              <a:rPr lang="en-US" dirty="0"/>
+              <a:t>PCB Arduino-to-headers-shield</a:t>
+            </a:r>
+          </a:p>
+          <a:p>
+            <a:r>
+              <a:rPr lang="en-US" dirty="0"/>
+              <a:t>0.1” Header strips</a:t>
+            </a:r>
+          </a:p>
+          <a:p>
+            <a:r>
+              <a:rPr lang="en-US" dirty="0"/>
+              <a:t>100 </a:t>
+            </a:r>
+            <a:r>
+              <a:rPr lang="en-US" dirty="0" err="1"/>
+              <a:t>kOhm</a:t>
+            </a:r>
+            <a:r>
+              <a:rPr lang="en-US" dirty="0"/>
+              <a:t> axial resistor</a:t>
+            </a:r>
+          </a:p>
+          <a:p>
+            <a:r>
+              <a:rPr lang="en-US" dirty="0"/>
+              <a:t>330 ohm axial resistor</a:t>
+            </a:r>
+          </a:p>
+          <a:p>
+            <a:r>
+              <a:rPr lang="en-US" dirty="0"/>
+              <a:t>1000 </a:t>
+            </a:r>
+            <a:r>
+              <a:rPr lang="en-US" dirty="0" err="1"/>
+              <a:t>uF</a:t>
+            </a:r>
+            <a:r>
+              <a:rPr lang="en-US" dirty="0"/>
+              <a:t> electrolytic capacitor with greater than 6 V max</a:t>
+            </a:r>
+          </a:p>
+          <a:p>
+            <a:r>
+              <a:rPr lang="en-US" dirty="0"/>
+              <a:t>2, 4 and 8 pin 0.1 inch female </a:t>
+            </a:r>
+            <a:r>
+              <a:rPr lang="en-US"/>
+              <a:t>to female header cables, 6” long</a:t>
+            </a:r>
+            <a:endParaRPr lang="en-US" dirty="0"/>
+          </a:p>
+          <a:p>
+            <a:r>
+              <a:rPr lang="en-US" dirty="0"/>
+              <a:t>Soldering iron and solder</a:t>
+            </a:r>
+          </a:p>
+          <a:p>
+            <a:r>
+              <a:rPr lang="en-US" dirty="0"/>
+              <a:t>An Arduino UNO is useful in assembly for holding pins in place during soldering</a:t>
+            </a:r>
+          </a:p>
+        </p:txBody>
+      </p:sp>
+    </p:spTree>
+    <p:extLst>
+      <p:ext uri="{BB962C8B-B14F-4D97-AF65-F5344CB8AC3E}">
+        <p14:creationId xmlns:p14="http://schemas.microsoft.com/office/powerpoint/2010/main" val="793981740"/>
       </p:ext>
     </p:extLst>
   </p:cSld>
@@ -3824,8 +3641,8 @@
         </p:blipFill>
         <p:spPr>
           <a:xfrm>
-            <a:off x="1155033" y="2188388"/>
-            <a:ext cx="2057687" cy="2896004"/>
+            <a:off x="866275" y="2498541"/>
+            <a:ext cx="1543265" cy="2172003"/>
           </a:xfrm>
           <a:prstGeom prst="rect">
             <a:avLst/>
@@ -3860,8 +3677,8 @@
         </p:blipFill>
         <p:spPr>
           <a:xfrm>
-            <a:off x="3588251" y="1642941"/>
-            <a:ext cx="3319841" cy="4147920"/>
+            <a:off x="2691189" y="2089456"/>
+            <a:ext cx="2489881" cy="3110940"/>
           </a:xfrm>
           <a:prstGeom prst="rect">
             <a:avLst/>
@@ -3896,8 +3713,8 @@
         </p:blipFill>
         <p:spPr>
           <a:xfrm>
-            <a:off x="7592815" y="1893910"/>
-            <a:ext cx="3680706" cy="3645982"/>
+            <a:off x="5694611" y="2277682"/>
+            <a:ext cx="2760530" cy="2734487"/>
           </a:xfrm>
           <a:prstGeom prst="rect">
             <a:avLst/>
@@ -3918,8 +3735,8 @@
         </p:nvSpPr>
         <p:spPr>
           <a:xfrm>
-            <a:off x="1696825" y="5684363"/>
-            <a:ext cx="401072" cy="369332"/>
+            <a:off x="1272619" y="5120522"/>
+            <a:ext cx="348172" cy="300082"/>
           </a:xfrm>
           <a:prstGeom prst="rect">
             <a:avLst/>
@@ -3933,7 +3750,7 @@
           <a:lstStyle/>
           <a:p>
             <a:r>
-              <a:rPr lang="en-US" dirty="0"/>
+              <a:rPr lang="en-US" sz="1350" dirty="0"/>
               <a:t>1x</a:t>
             </a:r>
           </a:p>
@@ -3953,8 +3770,8 @@
         </p:nvSpPr>
         <p:spPr>
           <a:xfrm>
-            <a:off x="5420413" y="5684363"/>
-            <a:ext cx="401072" cy="369332"/>
+            <a:off x="4065310" y="5120522"/>
+            <a:ext cx="348172" cy="300082"/>
           </a:xfrm>
           <a:prstGeom prst="rect">
             <a:avLst/>
@@ -3968,7 +3785,7 @@
           <a:lstStyle/>
           <a:p>
             <a:r>
-              <a:rPr lang="en-US" dirty="0"/>
+              <a:rPr lang="en-US" sz="1350" dirty="0"/>
               <a:t>1x</a:t>
             </a:r>
           </a:p>
@@ -3988,8 +3805,8 @@
         </p:nvSpPr>
         <p:spPr>
           <a:xfrm>
-            <a:off x="9144001" y="5684363"/>
-            <a:ext cx="401072" cy="369332"/>
+            <a:off x="6858001" y="5120522"/>
+            <a:ext cx="348172" cy="300082"/>
           </a:xfrm>
           <a:prstGeom prst="rect">
             <a:avLst/>
@@ -4003,7 +3820,7 @@
           <a:lstStyle/>
           <a:p>
             <a:r>
-              <a:rPr lang="en-US" dirty="0"/>
+              <a:rPr lang="en-US" sz="1350" dirty="0"/>
               <a:t>2x</a:t>
             </a:r>
           </a:p>
@@ -4095,8 +3912,8 @@
         </p:blipFill>
         <p:spPr>
           <a:xfrm>
-            <a:off x="2832559" y="1811423"/>
-            <a:ext cx="6660234" cy="4612943"/>
+            <a:off x="2124419" y="2215818"/>
+            <a:ext cx="4995176" cy="3459707"/>
           </a:xfrm>
           <a:prstGeom prst="rect">
             <a:avLst/>
@@ -4119,7 +3936,7 @@
 <file path=ppt/theme/theme1.xml><?xml version="1.0" encoding="utf-8"?>
 <a:theme xmlns:a="http://schemas.openxmlformats.org/drawingml/2006/main" name="Office Theme">
   <a:themeElements>
-    <a:clrScheme name="Office">
+    <a:clrScheme name="Office Theme">
       <a:dk1>
         <a:sysClr val="windowText" lastClr="000000"/>
       </a:dk1>
@@ -4157,7 +3974,7 @@
         <a:srgbClr val="954F72"/>
       </a:folHlink>
     </a:clrScheme>
-    <a:fontScheme name="Office">
+    <a:fontScheme name="Office Theme">
       <a:majorFont>
         <a:latin typeface="Calibri Light" panose="020F0302020204030204"/>
         <a:ea typeface=""/>
@@ -4192,23 +4009,6 @@
         <a:font script="Viet" typeface="Times New Roman"/>
         <a:font script="Uigh" typeface="Microsoft Uighur"/>
         <a:font script="Geor" typeface="Sylfaen"/>
-        <a:font script="Armn" typeface="Arial"/>
-        <a:font script="Bugi" typeface="Leelawadee UI"/>
-        <a:font script="Bopo" typeface="Microsoft JhengHei"/>
-        <a:font script="Java" typeface="Javanese Text"/>
-        <a:font script="Lisu" typeface="Segoe UI"/>
-        <a:font script="Mymr" typeface="Myanmar Text"/>
-        <a:font script="Nkoo" typeface="Ebrima"/>
-        <a:font script="Olck" typeface="Nirmala UI"/>
-        <a:font script="Osma" typeface="Ebrima"/>
-        <a:font script="Phag" typeface="Phagspa"/>
-        <a:font script="Syrn" typeface="Estrangelo Edessa"/>
-        <a:font script="Syrj" typeface="Estrangelo Edessa"/>
-        <a:font script="Syre" typeface="Estrangelo Edessa"/>
-        <a:font script="Sora" typeface="Nirmala UI"/>
-        <a:font script="Tale" typeface="Microsoft Tai Le"/>
-        <a:font script="Talu" typeface="Microsoft New Tai Lue"/>
-        <a:font script="Tfng" typeface="Ebrima"/>
       </a:majorFont>
       <a:minorFont>
         <a:latin typeface="Calibri" panose="020F0502020204030204"/>
@@ -4244,26 +4044,9 @@
         <a:font script="Viet" typeface="Arial"/>
         <a:font script="Uigh" typeface="Microsoft Uighur"/>
         <a:font script="Geor" typeface="Sylfaen"/>
-        <a:font script="Armn" typeface="Arial"/>
-        <a:font script="Bugi" typeface="Leelawadee UI"/>
-        <a:font script="Bopo" typeface="Microsoft JhengHei"/>
-        <a:font script="Java" typeface="Javanese Text"/>
-        <a:font script="Lisu" typeface="Segoe UI"/>
-        <a:font script="Mymr" typeface="Myanmar Text"/>
-        <a:font script="Nkoo" typeface="Ebrima"/>
-        <a:font script="Olck" typeface="Nirmala UI"/>
-        <a:font script="Osma" typeface="Ebrima"/>
-        <a:font script="Phag" typeface="Phagspa"/>
-        <a:font script="Syrn" typeface="Estrangelo Edessa"/>
-        <a:font script="Syrj" typeface="Estrangelo Edessa"/>
-        <a:font script="Syre" typeface="Estrangelo Edessa"/>
-        <a:font script="Sora" typeface="Nirmala UI"/>
-        <a:font script="Tale" typeface="Microsoft Tai Le"/>
-        <a:font script="Talu" typeface="Microsoft New Tai Lue"/>
-        <a:font script="Tfng" typeface="Ebrima"/>
       </a:minorFont>
     </a:fontScheme>
-    <a:fmtScheme name="Office">
+    <a:fmtScheme name="Office Theme">
       <a:fillStyleLst>
         <a:solidFill>
           <a:schemeClr val="phClr"/>
@@ -4405,7 +4188,7 @@
   <a:extraClrSchemeLst/>
   <a:extLst>
     <a:ext uri="{05A4C25C-085E-4340-85A3-A5531E510DB2}">
-      <thm15:themeFamily xmlns:thm15="http://schemas.microsoft.com/office/thememl/2012/main" name="Office Theme" id="{62F939B6-93AF-4DB8-9C6B-D6C7DFDC589F}" vid="{4A3C46E8-61CC-4603-A589-7422A47A8E4A}"/>
+      <thm15:themeFamily xmlns:thm15="http://schemas.microsoft.com/office/thememl/2012/main" name="Office 2013 - 2022 Theme" id="{62F939B6-93AF-4DB8-9C6B-D6C7DFDC589F}" vid="{4A3C46E8-61CC-4603-A589-7422A47A8E4A}"/>
     </a:ext>
   </a:extLst>
 </a:theme>

</xml_diff>